<commit_message>
Presentation update on Sundsy
</commit_message>
<xml_diff>
--- a/Project_2_Presentation.pptx
+++ b/Project_2_Presentation.pptx
@@ -5,7 +5,7 @@
     <p:sldMasterId id="2147483648" r:id="rId4"/>
   </p:sldMasterIdLst>
   <p:notesMasterIdLst>
-    <p:notesMasterId r:id="rId24"/>
+    <p:notesMasterId r:id="rId36"/>
   </p:notesMasterIdLst>
   <p:sldIdLst>
     <p:sldId id="530" r:id="rId5"/>
@@ -23,10 +23,22 @@
     <p:sldId id="562" r:id="rId17"/>
     <p:sldId id="565" r:id="rId18"/>
     <p:sldId id="559" r:id="rId19"/>
-    <p:sldId id="552" r:id="rId20"/>
-    <p:sldId id="553" r:id="rId21"/>
-    <p:sldId id="549" r:id="rId22"/>
-    <p:sldId id="544" r:id="rId23"/>
+    <p:sldId id="569" r:id="rId20"/>
+    <p:sldId id="570" r:id="rId21"/>
+    <p:sldId id="571" r:id="rId22"/>
+    <p:sldId id="572" r:id="rId23"/>
+    <p:sldId id="573" r:id="rId24"/>
+    <p:sldId id="574" r:id="rId25"/>
+    <p:sldId id="575" r:id="rId26"/>
+    <p:sldId id="576" r:id="rId27"/>
+    <p:sldId id="577" r:id="rId28"/>
+    <p:sldId id="578" r:id="rId29"/>
+    <p:sldId id="579" r:id="rId30"/>
+    <p:sldId id="580" r:id="rId31"/>
+    <p:sldId id="552" r:id="rId32"/>
+    <p:sldId id="553" r:id="rId33"/>
+    <p:sldId id="549" r:id="rId34"/>
+    <p:sldId id="544" r:id="rId35"/>
   </p:sldIdLst>
   <p:sldSz cx="12192000" cy="6858000"/>
   <p:notesSz cx="6858000" cy="9144000"/>
@@ -227,7 +239,7 @@
           <a:p>
             <a:fld id="{3F00BCFC-AFFD-334C-A183-6116BAFDF92B}" type="datetimeFigureOut">
               <a:rPr lang="en-US" smtClean="0"/>
-              <a:t>2/28/2024</a:t>
+              <a:t>2/29/2024</a:t>
             </a:fld>
             <a:endParaRPr lang="en-US" dirty="0"/>
           </a:p>
@@ -17323,7 +17335,7 @@
             </a:pPr>
             <a:r>
               <a:rPr lang="en-US" sz="2400" dirty="0"/>
-              <a:t>Referee favorability resulted in X and should be an individual contributing factor.</a:t>
+              <a:t>Referee favorability resulted in X and should be an individual contributing factor. Joe?</a:t>
             </a:r>
           </a:p>
           <a:p>
@@ -17402,11 +17414,41 @@
           <a:p>
             <a:r>
               <a:rPr lang="en-US" dirty="0"/>
-              <a:t>Historical data - Graph</a:t>
-            </a:r>
-          </a:p>
-        </p:txBody>
-      </p:sp>
+              <a:t>Best Accuracies</a:t>
+            </a:r>
+          </a:p>
+        </p:txBody>
+      </p:sp>
+      <p:pic>
+        <p:nvPicPr>
+          <p:cNvPr id="4" name="Picture 3" descr="A graph showing different colored rectangles&#10;&#10;Description automatically generated">
+            <a:extLst>
+              <a:ext uri="{FF2B5EF4-FFF2-40B4-BE49-F238E27FC236}">
+                <a16:creationId xmlns:a16="http://schemas.microsoft.com/office/drawing/2014/main" id="{77E85F82-8487-3EE2-2D02-D6D40D8C7357}"/>
+              </a:ext>
+            </a:extLst>
+          </p:cNvPr>
+          <p:cNvPicPr>
+            <a:picLocks noChangeAspect="1"/>
+          </p:cNvPicPr>
+          <p:nvPr/>
+        </p:nvPicPr>
+        <p:blipFill>
+          <a:blip r:embed="rId2"/>
+          <a:stretch>
+            <a:fillRect/>
+          </a:stretch>
+        </p:blipFill>
+        <p:spPr>
+          <a:xfrm>
+            <a:off x="2100261" y="1566520"/>
+            <a:ext cx="7735839" cy="4983490"/>
+          </a:xfrm>
+          <a:prstGeom prst="rect">
+            <a:avLst/>
+          </a:prstGeom>
+        </p:spPr>
+      </p:pic>
     </p:spTree>
     <p:extLst>
       <p:ext uri="{BB962C8B-B14F-4D97-AF65-F5344CB8AC3E}">
@@ -17465,11 +17507,41 @@
           <a:p>
             <a:r>
               <a:rPr lang="en-US" dirty="0"/>
-              <a:t>Historical data - Graph</a:t>
-            </a:r>
-          </a:p>
-        </p:txBody>
-      </p:sp>
+              <a:t>Decision Boundary</a:t>
+            </a:r>
+          </a:p>
+        </p:txBody>
+      </p:sp>
+      <p:pic>
+        <p:nvPicPr>
+          <p:cNvPr id="4" name="Picture 3" descr="A graph showing a line between two different colors&#10;&#10;Description automatically generated with medium confidence">
+            <a:extLst>
+              <a:ext uri="{FF2B5EF4-FFF2-40B4-BE49-F238E27FC236}">
+                <a16:creationId xmlns:a16="http://schemas.microsoft.com/office/drawing/2014/main" id="{731E9B80-96D8-A542-C6DE-1F3D66675F94}"/>
+              </a:ext>
+            </a:extLst>
+          </p:cNvPr>
+          <p:cNvPicPr>
+            <a:picLocks noChangeAspect="1"/>
+          </p:cNvPicPr>
+          <p:nvPr/>
+        </p:nvPicPr>
+        <p:blipFill>
+          <a:blip r:embed="rId2"/>
+          <a:stretch>
+            <a:fillRect/>
+          </a:stretch>
+        </p:blipFill>
+        <p:spPr>
+          <a:xfrm>
+            <a:off x="1523991" y="1299078"/>
+            <a:ext cx="9144018" cy="5486411"/>
+          </a:xfrm>
+          <a:prstGeom prst="rect">
+            <a:avLst/>
+          </a:prstGeom>
+        </p:spPr>
+      </p:pic>
     </p:spTree>
     <p:extLst>
       <p:ext uri="{BB962C8B-B14F-4D97-AF65-F5344CB8AC3E}">
@@ -17528,11 +17600,49 @@
           <a:p>
             <a:r>
               <a:rPr lang="en-US" dirty="0"/>
-              <a:t>Historical data - Graph</a:t>
-            </a:r>
-          </a:p>
-        </p:txBody>
-      </p:sp>
+              <a:t>ELO </a:t>
+            </a:r>
+            <a:r>
+              <a:rPr lang="en-US" dirty="0" err="1"/>
+              <a:t>Probablity</a:t>
+            </a:r>
+            <a:r>
+              <a:rPr lang="en-US" dirty="0"/>
+              <a:t> vs score</a:t>
+            </a:r>
+          </a:p>
+        </p:txBody>
+      </p:sp>
+      <p:pic>
+        <p:nvPicPr>
+          <p:cNvPr id="4" name="Picture 3" descr="A red and blue diagram&#10;&#10;Description automatically generated">
+            <a:extLst>
+              <a:ext uri="{FF2B5EF4-FFF2-40B4-BE49-F238E27FC236}">
+                <a16:creationId xmlns:a16="http://schemas.microsoft.com/office/drawing/2014/main" id="{E64CAED2-EBA7-5E67-A710-59CFCD97AE98}"/>
+              </a:ext>
+            </a:extLst>
+          </p:cNvPr>
+          <p:cNvPicPr>
+            <a:picLocks noChangeAspect="1"/>
+          </p:cNvPicPr>
+          <p:nvPr/>
+        </p:nvPicPr>
+        <p:blipFill>
+          <a:blip r:embed="rId2"/>
+          <a:stretch>
+            <a:fillRect/>
+          </a:stretch>
+        </p:blipFill>
+        <p:spPr>
+          <a:xfrm>
+            <a:off x="1523991" y="1216736"/>
+            <a:ext cx="9144018" cy="5486411"/>
+          </a:xfrm>
+          <a:prstGeom prst="rect">
+            <a:avLst/>
+          </a:prstGeom>
+        </p:spPr>
+      </p:pic>
     </p:spTree>
     <p:extLst>
       <p:ext uri="{BB962C8B-B14F-4D97-AF65-F5344CB8AC3E}">
@@ -17591,11 +17701,41 @@
           <a:p>
             <a:r>
               <a:rPr lang="en-US" dirty="0"/>
-              <a:t>Historical data - Graph</a:t>
-            </a:r>
-          </a:p>
-        </p:txBody>
-      </p:sp>
+              <a:t>ELO rating vs winner</a:t>
+            </a:r>
+          </a:p>
+        </p:txBody>
+      </p:sp>
+      <p:pic>
+        <p:nvPicPr>
+          <p:cNvPr id="4" name="Picture 3" descr="A yellow and purple dots&#10;&#10;Description automatically generated">
+            <a:extLst>
+              <a:ext uri="{FF2B5EF4-FFF2-40B4-BE49-F238E27FC236}">
+                <a16:creationId xmlns:a16="http://schemas.microsoft.com/office/drawing/2014/main" id="{5B8FBACB-89E4-CE3F-13C9-4B7B6DB8B4CE}"/>
+              </a:ext>
+            </a:extLst>
+          </p:cNvPr>
+          <p:cNvPicPr>
+            <a:picLocks noChangeAspect="1"/>
+          </p:cNvPicPr>
+          <p:nvPr/>
+        </p:nvPicPr>
+        <p:blipFill>
+          <a:blip r:embed="rId2"/>
+          <a:stretch>
+            <a:fillRect/>
+          </a:stretch>
+        </p:blipFill>
+        <p:spPr>
+          <a:xfrm>
+            <a:off x="1680087" y="1145835"/>
+            <a:ext cx="8568248" cy="5712165"/>
+          </a:xfrm>
+          <a:prstGeom prst="rect">
+            <a:avLst/>
+          </a:prstGeom>
+        </p:spPr>
+      </p:pic>
     </p:spTree>
     <p:extLst>
       <p:ext uri="{BB962C8B-B14F-4D97-AF65-F5344CB8AC3E}">
@@ -17654,11 +17794,41 @@
           <a:p>
             <a:r>
               <a:rPr lang="en-US" dirty="0"/>
-              <a:t>Historical data - Graph</a:t>
-            </a:r>
-          </a:p>
-        </p:txBody>
-      </p:sp>
+              <a:t>Elo pregame vs winner</a:t>
+            </a:r>
+          </a:p>
+        </p:txBody>
+      </p:sp>
+      <p:pic>
+        <p:nvPicPr>
+          <p:cNvPr id="4" name="Picture 3" descr="A screen shot of a computer screen&#10;&#10;Description automatically generated">
+            <a:extLst>
+              <a:ext uri="{FF2B5EF4-FFF2-40B4-BE49-F238E27FC236}">
+                <a16:creationId xmlns:a16="http://schemas.microsoft.com/office/drawing/2014/main" id="{00F6D499-5AD1-077A-49C2-1708906E2A61}"/>
+              </a:ext>
+            </a:extLst>
+          </p:cNvPr>
+          <p:cNvPicPr>
+            <a:picLocks noChangeAspect="1"/>
+          </p:cNvPicPr>
+          <p:nvPr/>
+        </p:nvPicPr>
+        <p:blipFill>
+          <a:blip r:embed="rId2"/>
+          <a:stretch>
+            <a:fillRect/>
+          </a:stretch>
+        </p:blipFill>
+        <p:spPr>
+          <a:xfrm>
+            <a:off x="1523991" y="1391756"/>
+            <a:ext cx="8868706" cy="5321224"/>
+          </a:xfrm>
+          <a:prstGeom prst="rect">
+            <a:avLst/>
+          </a:prstGeom>
+        </p:spPr>
+      </p:pic>
     </p:spTree>
     <p:extLst>
       <p:ext uri="{BB962C8B-B14F-4D97-AF65-F5344CB8AC3E}">
@@ -17677,7 +17847,13 @@
   <p:cSld>
     <p:spTree>
       <p:nvGrpSpPr>
-        <p:cNvPr id="1" name=""/>
+        <p:cNvPr id="1" name="">
+          <a:extLst>
+            <a:ext uri="{FF2B5EF4-FFF2-40B4-BE49-F238E27FC236}">
+              <a16:creationId xmlns:a16="http://schemas.microsoft.com/office/drawing/2014/main" id="{EE6D1B3F-A669-53AE-563E-BAFFAB9D7AC3}"/>
+            </a:ext>
+          </a:extLst>
+        </p:cNvPr>
         <p:cNvGrpSpPr/>
         <p:nvPr/>
       </p:nvGrpSpPr>
@@ -17694,7 +17870,7 @@
           <p:cNvPr id="2" name="Title 1">
             <a:extLst>
               <a:ext uri="{FF2B5EF4-FFF2-40B4-BE49-F238E27FC236}">
-                <a16:creationId xmlns:a16="http://schemas.microsoft.com/office/drawing/2014/main" id="{F41F0E99-07CC-9576-AFD7-C52151AD0EA3}"/>
+                <a16:creationId xmlns:a16="http://schemas.microsoft.com/office/drawing/2014/main" id="{27262F0A-B1FC-F1B7-AC6B-E69D72B528B4}"/>
               </a:ext>
             </a:extLst>
           </p:cNvPr>
@@ -17707,8 +17883,8 @@
         </p:nvSpPr>
         <p:spPr>
           <a:xfrm>
-            <a:off x="1987455" y="72511"/>
-            <a:ext cx="8776797" cy="1069848"/>
+            <a:off x="1155032" y="72511"/>
+            <a:ext cx="8568248" cy="1069848"/>
           </a:xfrm>
         </p:spPr>
         <p:txBody>
@@ -17717,63 +17893,58 @@
           <a:p>
             <a:r>
               <a:rPr lang="en-US" dirty="0"/>
-              <a:t>Findings and implications</a:t>
-            </a:r>
-          </a:p>
-        </p:txBody>
-      </p:sp>
-      <p:sp>
-        <p:nvSpPr>
-          <p:cNvPr id="3" name="Subtitle 2">
-            <a:extLst>
-              <a:ext uri="{FF2B5EF4-FFF2-40B4-BE49-F238E27FC236}">
-                <a16:creationId xmlns:a16="http://schemas.microsoft.com/office/drawing/2014/main" id="{5A82A8B0-333F-633E-3FA7-D38DBFB10971}"/>
-              </a:ext>
-            </a:extLst>
-          </p:cNvPr>
-          <p:cNvSpPr>
-            <a:spLocks noGrp="1"/>
-          </p:cNvSpPr>
-          <p:nvPr>
-            <p:ph type="subTitle" idx="1"/>
-          </p:nvPr>
-        </p:nvSpPr>
+              <a:t>Difference in </a:t>
+            </a:r>
+            <a:r>
+              <a:rPr lang="en-US" dirty="0" err="1"/>
+              <a:t>qb</a:t>
+            </a:r>
+            <a:r>
+              <a:rPr lang="en-US" dirty="0"/>
+              <a:t> </a:t>
+            </a:r>
+            <a:r>
+              <a:rPr lang="en-US" dirty="0" err="1"/>
+              <a:t>elo</a:t>
+            </a:r>
+            <a:endParaRPr lang="en-US" dirty="0"/>
+          </a:p>
+        </p:txBody>
+      </p:sp>
+      <p:pic>
+        <p:nvPicPr>
+          <p:cNvPr id="4" name="Picture 3" descr="A blue line graph with white text&#10;&#10;Description automatically generated">
+            <a:extLst>
+              <a:ext uri="{FF2B5EF4-FFF2-40B4-BE49-F238E27FC236}">
+                <a16:creationId xmlns:a16="http://schemas.microsoft.com/office/drawing/2014/main" id="{93EB53C2-6BF7-4FC0-9F6E-A967385B4B28}"/>
+              </a:ext>
+            </a:extLst>
+          </p:cNvPr>
+          <p:cNvPicPr>
+            <a:picLocks noChangeAspect="1"/>
+          </p:cNvPicPr>
+          <p:nvPr/>
+        </p:nvPicPr>
+        <p:blipFill>
+          <a:blip r:embed="rId2"/>
+          <a:stretch>
+            <a:fillRect/>
+          </a:stretch>
+        </p:blipFill>
         <p:spPr>
           <a:xfrm>
-            <a:off x="505325" y="1259305"/>
-            <a:ext cx="11269579" cy="5430253"/>
-          </a:xfrm>
-        </p:spPr>
-        <p:txBody>
-          <a:bodyPr/>
-          <a:lstStyle/>
-          <a:p>
-            <a:br>
-              <a:rPr lang="en-US" sz="2800" b="0" dirty="0">
-                <a:solidFill>
-                  <a:srgbClr val="CCCCCC"/>
-                </a:solidFill>
-                <a:effectLst/>
-                <a:latin typeface="Consolas" panose="020B0609020204030204" pitchFamily="49" charset="0"/>
-              </a:rPr>
-            </a:br>
-            <a:endParaRPr lang="en-US" sz="2800" b="0" dirty="0">
-              <a:solidFill>
-                <a:srgbClr val="CCCCCC"/>
-              </a:solidFill>
-              <a:effectLst/>
-              <a:latin typeface="Consolas" panose="020B0609020204030204" pitchFamily="49" charset="0"/>
-            </a:endParaRPr>
-          </a:p>
-          <a:p>
-            <a:endParaRPr lang="en-US" dirty="0"/>
-          </a:p>
-        </p:txBody>
-      </p:sp>
+            <a:off x="1912369" y="1765132"/>
+            <a:ext cx="8367261" cy="5020357"/>
+          </a:xfrm>
+          <a:prstGeom prst="rect">
+            <a:avLst/>
+          </a:prstGeom>
+        </p:spPr>
+      </p:pic>
     </p:spTree>
     <p:extLst>
       <p:ext uri="{BB962C8B-B14F-4D97-AF65-F5344CB8AC3E}">
-        <p14:creationId xmlns:p14="http://schemas.microsoft.com/office/powerpoint/2010/main" val="4174470146"/>
+        <p14:creationId xmlns:p14="http://schemas.microsoft.com/office/powerpoint/2010/main" val="3392102013"/>
       </p:ext>
     </p:extLst>
   </p:cSld>
@@ -17788,7 +17959,13 @@
   <p:cSld>
     <p:spTree>
       <p:nvGrpSpPr>
-        <p:cNvPr id="1" name=""/>
+        <p:cNvPr id="1" name="">
+          <a:extLst>
+            <a:ext uri="{FF2B5EF4-FFF2-40B4-BE49-F238E27FC236}">
+              <a16:creationId xmlns:a16="http://schemas.microsoft.com/office/drawing/2014/main" id="{C533DD14-A3D8-CDB7-8668-236F9A117E6B}"/>
+            </a:ext>
+          </a:extLst>
+        </p:cNvPr>
         <p:cNvGrpSpPr/>
         <p:nvPr/>
       </p:nvGrpSpPr>
@@ -17805,7 +17982,7 @@
           <p:cNvPr id="2" name="Title 1">
             <a:extLst>
               <a:ext uri="{FF2B5EF4-FFF2-40B4-BE49-F238E27FC236}">
-                <a16:creationId xmlns:a16="http://schemas.microsoft.com/office/drawing/2014/main" id="{F41F0E99-07CC-9576-AFD7-C52151AD0EA3}"/>
+                <a16:creationId xmlns:a16="http://schemas.microsoft.com/office/drawing/2014/main" id="{FD3D1DDD-8A9B-B2EA-AB3F-8A3C898735A0}"/>
               </a:ext>
             </a:extLst>
           </p:cNvPr>
@@ -17818,8 +17995,8 @@
         </p:nvSpPr>
         <p:spPr>
           <a:xfrm>
-            <a:off x="1987456" y="72511"/>
-            <a:ext cx="8937218" cy="1069848"/>
+            <a:off x="1155032" y="72511"/>
+            <a:ext cx="8568248" cy="1069848"/>
           </a:xfrm>
         </p:spPr>
         <p:txBody>
@@ -17828,93 +18005,61 @@
           <a:p>
             <a:r>
               <a:rPr lang="en-US" dirty="0"/>
-              <a:t>Software version control</a:t>
-            </a:r>
-          </a:p>
-        </p:txBody>
-      </p:sp>
-      <p:sp>
-        <p:nvSpPr>
-          <p:cNvPr id="3" name="Subtitle 2">
-            <a:extLst>
-              <a:ext uri="{FF2B5EF4-FFF2-40B4-BE49-F238E27FC236}">
-                <a16:creationId xmlns:a16="http://schemas.microsoft.com/office/drawing/2014/main" id="{5A82A8B0-333F-633E-3FA7-D38DBFB10971}"/>
-              </a:ext>
-            </a:extLst>
-          </p:cNvPr>
-          <p:cNvSpPr>
-            <a:spLocks noGrp="1"/>
-          </p:cNvSpPr>
-          <p:nvPr>
-            <p:ph type="subTitle" idx="1"/>
-          </p:nvPr>
-        </p:nvSpPr>
+              <a:t>Difference in </a:t>
+            </a:r>
+            <a:r>
+              <a:rPr lang="en-US" dirty="0" err="1"/>
+              <a:t>qb</a:t>
+            </a:r>
+            <a:r>
+              <a:rPr lang="en-US" dirty="0"/>
+              <a:t> </a:t>
+            </a:r>
+            <a:r>
+              <a:rPr lang="en-US" dirty="0" err="1"/>
+              <a:t>elo</a:t>
+            </a:r>
+            <a:r>
+              <a:rPr lang="en-US" dirty="0"/>
+              <a:t> when team 1 wins</a:t>
+            </a:r>
+          </a:p>
+        </p:txBody>
+      </p:sp>
+      <p:pic>
+        <p:nvPicPr>
+          <p:cNvPr id="4" name="Picture 3" descr="A blue line graph with white text&#10;&#10;Description automatically generated">
+            <a:extLst>
+              <a:ext uri="{FF2B5EF4-FFF2-40B4-BE49-F238E27FC236}">
+                <a16:creationId xmlns:a16="http://schemas.microsoft.com/office/drawing/2014/main" id="{CF3C8DDA-A65C-BEC6-0AA3-1FD838920564}"/>
+              </a:ext>
+            </a:extLst>
+          </p:cNvPr>
+          <p:cNvPicPr>
+            <a:picLocks noChangeAspect="1"/>
+          </p:cNvPicPr>
+          <p:nvPr/>
+        </p:nvPicPr>
+        <p:blipFill>
+          <a:blip r:embed="rId2"/>
+          <a:stretch>
+            <a:fillRect/>
+          </a:stretch>
+        </p:blipFill>
         <p:spPr>
           <a:xfrm>
-            <a:off x="505325" y="1259305"/>
-            <a:ext cx="11269579" cy="5430253"/>
-          </a:xfrm>
-        </p:spPr>
-        <p:txBody>
-          <a:bodyPr/>
-          <a:lstStyle/>
-          <a:p>
-            <a:pPr marL="457200" indent="-457200" algn="l">
-              <a:buFont typeface="Arial" panose="020B0604020202020204" pitchFamily="34" charset="0"/>
-              <a:buChar char="•"/>
-            </a:pPr>
-            <a:r>
-              <a:rPr lang="en-US" sz="2800" b="0" dirty="0">
-                <a:solidFill>
-                  <a:srgbClr val="CCCCCC"/>
-                </a:solidFill>
-                <a:effectLst/>
-                <a:latin typeface="Consolas" panose="020B0609020204030204" pitchFamily="49" charset="0"/>
-              </a:rPr>
-              <a:t>A GitHub repository was created - all group members contributed to repository.</a:t>
-            </a:r>
-          </a:p>
-          <a:p>
-            <a:pPr marL="457200" indent="-457200" algn="l">
-              <a:buFont typeface="Arial" panose="020B0604020202020204" pitchFamily="34" charset="0"/>
-              <a:buChar char="•"/>
-            </a:pPr>
-            <a:r>
-              <a:rPr lang="en-US" sz="2800" b="0" dirty="0">
-                <a:solidFill>
-                  <a:srgbClr val="CCCCCC"/>
-                </a:solidFill>
-                <a:effectLst/>
-                <a:latin typeface="Consolas" panose="020B0609020204030204" pitchFamily="49" charset="0"/>
-              </a:rPr>
-              <a:t>Each GitHub commit was annotated to ensure proper communication between group members.</a:t>
-            </a:r>
-          </a:p>
-          <a:p>
-            <a:pPr marL="457200" indent="-457200" algn="l">
-              <a:buFont typeface="Arial" panose="020B0604020202020204" pitchFamily="34" charset="0"/>
-              <a:buChar char="•"/>
-            </a:pPr>
-            <a:r>
-              <a:rPr lang="en-US" sz="2800" b="0" dirty="0">
-                <a:solidFill>
-                  <a:srgbClr val="CCCCCC"/>
-                </a:solidFill>
-                <a:effectLst/>
-                <a:latin typeface="Consolas" panose="020B0609020204030204" pitchFamily="49" charset="0"/>
-              </a:rPr>
-              <a:t>Supporting files were also uploaded and evaluated by the group.</a:t>
-            </a:r>
-          </a:p>
-          <a:p>
-            <a:endParaRPr lang="en-US" dirty="0"/>
-          </a:p>
-        </p:txBody>
-      </p:sp>
+            <a:off x="1921624" y="1646897"/>
+            <a:ext cx="8357428" cy="5014457"/>
+          </a:xfrm>
+          <a:prstGeom prst="rect">
+            <a:avLst/>
+          </a:prstGeom>
+        </p:spPr>
+      </p:pic>
     </p:spTree>
     <p:extLst>
       <p:ext uri="{BB962C8B-B14F-4D97-AF65-F5344CB8AC3E}">
-        <p14:creationId xmlns:p14="http://schemas.microsoft.com/office/powerpoint/2010/main" val="4153323784"/>
+        <p14:creationId xmlns:p14="http://schemas.microsoft.com/office/powerpoint/2010/main" val="1589518959"/>
       </p:ext>
     </p:extLst>
   </p:cSld>
@@ -17929,7 +18074,13 @@
   <p:cSld>
     <p:spTree>
       <p:nvGrpSpPr>
-        <p:cNvPr id="1" name=""/>
+        <p:cNvPr id="1" name="">
+          <a:extLst>
+            <a:ext uri="{FF2B5EF4-FFF2-40B4-BE49-F238E27FC236}">
+              <a16:creationId xmlns:a16="http://schemas.microsoft.com/office/drawing/2014/main" id="{2884CA1B-86B1-7E7A-8764-A483CB4BBA9A}"/>
+            </a:ext>
+          </a:extLst>
+        </p:cNvPr>
         <p:cNvGrpSpPr/>
         <p:nvPr/>
       </p:nvGrpSpPr>
@@ -17946,7 +18097,7 @@
           <p:cNvPr id="2" name="Title 1">
             <a:extLst>
               <a:ext uri="{FF2B5EF4-FFF2-40B4-BE49-F238E27FC236}">
-                <a16:creationId xmlns:a16="http://schemas.microsoft.com/office/drawing/2014/main" id="{F41F0E99-07CC-9576-AFD7-C52151AD0EA3}"/>
+                <a16:creationId xmlns:a16="http://schemas.microsoft.com/office/drawing/2014/main" id="{9D2ADB80-D04A-704E-3B2E-1C3E26A50FD2}"/>
               </a:ext>
             </a:extLst>
           </p:cNvPr>
@@ -17959,8 +18110,8 @@
         </p:nvSpPr>
         <p:spPr>
           <a:xfrm>
-            <a:off x="1987456" y="72511"/>
-            <a:ext cx="7735824" cy="1069848"/>
+            <a:off x="1155032" y="72511"/>
+            <a:ext cx="8568248" cy="1069848"/>
           </a:xfrm>
         </p:spPr>
         <p:txBody>
@@ -17969,61 +18120,61 @@
           <a:p>
             <a:r>
               <a:rPr lang="en-US" dirty="0"/>
-              <a:t>Future development</a:t>
-            </a:r>
-          </a:p>
-        </p:txBody>
-      </p:sp>
-      <p:sp>
-        <p:nvSpPr>
-          <p:cNvPr id="3" name="Subtitle 2">
-            <a:extLst>
-              <a:ext uri="{FF2B5EF4-FFF2-40B4-BE49-F238E27FC236}">
-                <a16:creationId xmlns:a16="http://schemas.microsoft.com/office/drawing/2014/main" id="{5A82A8B0-333F-633E-3FA7-D38DBFB10971}"/>
-              </a:ext>
-            </a:extLst>
-          </p:cNvPr>
-          <p:cNvSpPr>
-            <a:spLocks noGrp="1"/>
-          </p:cNvSpPr>
-          <p:nvPr>
-            <p:ph type="subTitle" idx="1"/>
-          </p:nvPr>
-        </p:nvSpPr>
+              <a:t>Difference in </a:t>
+            </a:r>
+            <a:r>
+              <a:rPr lang="en-US" dirty="0" err="1"/>
+              <a:t>qb</a:t>
+            </a:r>
+            <a:r>
+              <a:rPr lang="en-US" dirty="0"/>
+              <a:t> </a:t>
+            </a:r>
+            <a:r>
+              <a:rPr lang="en-US" dirty="0" err="1"/>
+              <a:t>elo</a:t>
+            </a:r>
+            <a:r>
+              <a:rPr lang="en-US" dirty="0"/>
+              <a:t> when team 2 wins</a:t>
+            </a:r>
+          </a:p>
+        </p:txBody>
+      </p:sp>
+      <p:pic>
+        <p:nvPicPr>
+          <p:cNvPr id="4" name="Picture 3" descr="A blue line graph with white text&#10;&#10;Description automatically generated">
+            <a:extLst>
+              <a:ext uri="{FF2B5EF4-FFF2-40B4-BE49-F238E27FC236}">
+                <a16:creationId xmlns:a16="http://schemas.microsoft.com/office/drawing/2014/main" id="{E3B897F0-51C7-E94D-85F9-F9B23BE654C5}"/>
+              </a:ext>
+            </a:extLst>
+          </p:cNvPr>
+          <p:cNvPicPr>
+            <a:picLocks noChangeAspect="1"/>
+          </p:cNvPicPr>
+          <p:nvPr/>
+        </p:nvPicPr>
+        <p:blipFill>
+          <a:blip r:embed="rId2"/>
+          <a:stretch>
+            <a:fillRect/>
+          </a:stretch>
+        </p:blipFill>
         <p:spPr>
           <a:xfrm>
-            <a:off x="505325" y="1259305"/>
-            <a:ext cx="11269579" cy="5430253"/>
-          </a:xfrm>
-        </p:spPr>
-        <p:txBody>
-          <a:bodyPr/>
-          <a:lstStyle/>
-          <a:p>
-            <a:pPr marL="457200" indent="-457200" algn="l">
-              <a:buFont typeface="Arial" panose="020B0604020202020204" pitchFamily="34" charset="0"/>
-              <a:buChar char="•"/>
-            </a:pPr>
-            <a:r>
-              <a:rPr lang="en-US" sz="2800" b="0" dirty="0">
-                <a:solidFill>
-                  <a:srgbClr val="CCCCCC"/>
-                </a:solidFill>
-                <a:effectLst/>
-                <a:latin typeface="Consolas" panose="020B0609020204030204" pitchFamily="49" charset="0"/>
-              </a:rPr>
-              <a:t>Future development includes</a:t>
-            </a:r>
-          </a:p>
-          <a:p>
-            <a:endParaRPr lang="en-US" dirty="0"/>
-          </a:p>
-        </p:txBody>
-      </p:sp>
+            <a:off x="1641978" y="1564555"/>
+            <a:ext cx="8701557" cy="5220934"/>
+          </a:xfrm>
+          <a:prstGeom prst="rect">
+            <a:avLst/>
+          </a:prstGeom>
+        </p:spPr>
+      </p:pic>
     </p:spTree>
     <p:extLst>
       <p:ext uri="{BB962C8B-B14F-4D97-AF65-F5344CB8AC3E}">
-        <p14:creationId xmlns:p14="http://schemas.microsoft.com/office/powerpoint/2010/main" val="87203755"/>
+        <p14:creationId xmlns:p14="http://schemas.microsoft.com/office/powerpoint/2010/main" val="769914348"/>
       </p:ext>
     </p:extLst>
   </p:cSld>
@@ -18038,7 +18189,13 @@
   <p:cSld>
     <p:spTree>
       <p:nvGrpSpPr>
-        <p:cNvPr id="1" name=""/>
+        <p:cNvPr id="1" name="">
+          <a:extLst>
+            <a:ext uri="{FF2B5EF4-FFF2-40B4-BE49-F238E27FC236}">
+              <a16:creationId xmlns:a16="http://schemas.microsoft.com/office/drawing/2014/main" id="{5D3A9BDB-384A-6DFE-C125-2AC7FC5C5E30}"/>
+            </a:ext>
+          </a:extLst>
+        </p:cNvPr>
         <p:cNvGrpSpPr/>
         <p:nvPr/>
       </p:nvGrpSpPr>
@@ -18055,7 +18212,7 @@
           <p:cNvPr id="2" name="Title 1">
             <a:extLst>
               <a:ext uri="{FF2B5EF4-FFF2-40B4-BE49-F238E27FC236}">
-                <a16:creationId xmlns:a16="http://schemas.microsoft.com/office/drawing/2014/main" id="{2C9E1892-81E6-551C-7B5A-DEA68224520B}"/>
+                <a16:creationId xmlns:a16="http://schemas.microsoft.com/office/drawing/2014/main" id="{68C5D0CA-7E48-8DE2-7B7F-355CD07F3C88}"/>
               </a:ext>
             </a:extLst>
           </p:cNvPr>
@@ -18063,35 +18220,72 @@
             <a:spLocks noGrp="1"/>
           </p:cNvSpPr>
           <p:nvPr>
-            <p:ph type="title"/>
+            <p:ph type="ctrTitle"/>
           </p:nvPr>
         </p:nvSpPr>
-        <p:spPr/>
+        <p:spPr>
+          <a:xfrm>
+            <a:off x="1155032" y="72511"/>
+            <a:ext cx="8568248" cy="1069848"/>
+          </a:xfrm>
+        </p:spPr>
         <p:txBody>
           <a:bodyPr/>
           <a:lstStyle/>
           <a:p>
             <a:r>
-              <a:rPr lang="en-US" sz="4800" b="1" spc="600" dirty="0">
-                <a:ln w="28575">
-                  <a:noFill/>
-                  <a:prstDash val="solid"/>
-                </a:ln>
-                <a:solidFill>
-                  <a:schemeClr val="bg1"/>
-                </a:solidFill>
-                <a:latin typeface="Tw Cen MT" panose="020B0602020104020603" pitchFamily="34" charset="77"/>
-              </a:rPr>
-              <a:t>THANK YOU</a:t>
-            </a:r>
-            <a:endParaRPr lang="en-US" dirty="0"/>
-          </a:p>
-        </p:txBody>
-      </p:sp>
+              <a:rPr lang="en-US" dirty="0" err="1"/>
+              <a:t>Qb</a:t>
+            </a:r>
+            <a:r>
+              <a:rPr lang="en-US" dirty="0"/>
+              <a:t> adjusted </a:t>
+            </a:r>
+            <a:r>
+              <a:rPr lang="en-US" dirty="0" err="1"/>
+              <a:t>elo</a:t>
+            </a:r>
+            <a:r>
+              <a:rPr lang="en-US" dirty="0"/>
+              <a:t> difference vs winner</a:t>
+            </a:r>
+          </a:p>
+        </p:txBody>
+      </p:sp>
+      <p:pic>
+        <p:nvPicPr>
+          <p:cNvPr id="4" name="Picture 3" descr="A screen shot of a graph&#10;&#10;Description automatically generated">
+            <a:extLst>
+              <a:ext uri="{FF2B5EF4-FFF2-40B4-BE49-F238E27FC236}">
+                <a16:creationId xmlns:a16="http://schemas.microsoft.com/office/drawing/2014/main" id="{D4C5CD01-15A0-B346-2363-906DE03E7DB6}"/>
+              </a:ext>
+            </a:extLst>
+          </p:cNvPr>
+          <p:cNvPicPr>
+            <a:picLocks noChangeAspect="1"/>
+          </p:cNvPicPr>
+          <p:nvPr/>
+        </p:nvPicPr>
+        <p:blipFill>
+          <a:blip r:embed="rId2"/>
+          <a:stretch>
+            <a:fillRect/>
+          </a:stretch>
+        </p:blipFill>
+        <p:spPr>
+          <a:xfrm>
+            <a:off x="1523991" y="1299078"/>
+            <a:ext cx="9144018" cy="5486411"/>
+          </a:xfrm>
+          <a:prstGeom prst="rect">
+            <a:avLst/>
+          </a:prstGeom>
+        </p:spPr>
+      </p:pic>
     </p:spTree>
     <p:extLst>
       <p:ext uri="{BB962C8B-B14F-4D97-AF65-F5344CB8AC3E}">
-        <p14:creationId xmlns:p14="http://schemas.microsoft.com/office/powerpoint/2010/main" val="1877701230"/>
+        <p14:creationId xmlns:p14="http://schemas.microsoft.com/office/powerpoint/2010/main" val="2948521662"/>
       </p:ext>
     </p:extLst>
   </p:cSld>
@@ -18227,7 +18421,39 @@
                 <a:effectLst/>
                 <a:latin typeface="Consolas" panose="020B0609020204030204" pitchFamily="49" charset="0"/>
               </a:rPr>
-              <a:t>The purpose of the project was to identify - </a:t>
+              <a:t>This page is still in </a:t>
+            </a:r>
+            <a:r>
+              <a:rPr lang="en-US" sz="1800" b="0">
+                <a:solidFill>
+                  <a:srgbClr val="CCCCCC"/>
+                </a:solidFill>
+                <a:effectLst/>
+                <a:latin typeface="Consolas" panose="020B0609020204030204" pitchFamily="49" charset="0"/>
+              </a:rPr>
+              <a:t>editing process – </a:t>
+            </a:r>
+          </a:p>
+          <a:p>
+            <a:r>
+              <a:rPr lang="en-US" sz="1800" b="0">
+                <a:solidFill>
+                  <a:srgbClr val="CCCCCC"/>
+                </a:solidFill>
+                <a:effectLst/>
+                <a:latin typeface="Consolas" panose="020B0609020204030204" pitchFamily="49" charset="0"/>
+              </a:rPr>
+              <a:t>The </a:t>
+            </a:r>
+            <a:r>
+              <a:rPr lang="en-US" sz="1800" b="0" dirty="0">
+                <a:solidFill>
+                  <a:srgbClr val="CCCCCC"/>
+                </a:solidFill>
+                <a:effectLst/>
+                <a:latin typeface="Consolas" panose="020B0609020204030204" pitchFamily="49" charset="0"/>
+              </a:rPr>
+              <a:t>purpose of the project was to identify - </a:t>
             </a:r>
           </a:p>
           <a:p>
@@ -18420,6 +18646,1028 @@
     <p:extLst>
       <p:ext uri="{BB962C8B-B14F-4D97-AF65-F5344CB8AC3E}">
         <p14:creationId xmlns:p14="http://schemas.microsoft.com/office/powerpoint/2010/main" val="3548027083"/>
+      </p:ext>
+    </p:extLst>
+  </p:cSld>
+  <p:clrMapOvr>
+    <a:masterClrMapping/>
+  </p:clrMapOvr>
+</p:sld>
+</file>
+
+<file path=ppt/slides/slide20.xml><?xml version="1.0" encoding="utf-8"?>
+<p:sld xmlns:a="http://schemas.openxmlformats.org/drawingml/2006/main" xmlns:r="http://schemas.openxmlformats.org/officeDocument/2006/relationships" xmlns:p="http://schemas.openxmlformats.org/presentationml/2006/main">
+  <p:cSld>
+    <p:spTree>
+      <p:nvGrpSpPr>
+        <p:cNvPr id="1" name="">
+          <a:extLst>
+            <a:ext uri="{FF2B5EF4-FFF2-40B4-BE49-F238E27FC236}">
+              <a16:creationId xmlns:a16="http://schemas.microsoft.com/office/drawing/2014/main" id="{AB509892-7506-4CDF-3F0F-F326F3A1D1B2}"/>
+            </a:ext>
+          </a:extLst>
+        </p:cNvPr>
+        <p:cNvGrpSpPr/>
+        <p:nvPr/>
+      </p:nvGrpSpPr>
+      <p:grpSpPr>
+        <a:xfrm>
+          <a:off x="0" y="0"/>
+          <a:ext cx="0" cy="0"/>
+          <a:chOff x="0" y="0"/>
+          <a:chExt cx="0" cy="0"/>
+        </a:xfrm>
+      </p:grpSpPr>
+      <p:sp>
+        <p:nvSpPr>
+          <p:cNvPr id="2" name="Title 1">
+            <a:extLst>
+              <a:ext uri="{FF2B5EF4-FFF2-40B4-BE49-F238E27FC236}">
+                <a16:creationId xmlns:a16="http://schemas.microsoft.com/office/drawing/2014/main" id="{A4FC6A8C-974B-78DF-0478-F3A761380694}"/>
+              </a:ext>
+            </a:extLst>
+          </p:cNvPr>
+          <p:cNvSpPr>
+            <a:spLocks noGrp="1"/>
+          </p:cNvSpPr>
+          <p:nvPr>
+            <p:ph type="ctrTitle"/>
+          </p:nvPr>
+        </p:nvSpPr>
+        <p:spPr>
+          <a:xfrm>
+            <a:off x="1155032" y="72511"/>
+            <a:ext cx="8568248" cy="1069848"/>
+          </a:xfrm>
+        </p:spPr>
+        <p:txBody>
+          <a:bodyPr/>
+          <a:lstStyle/>
+          <a:p>
+            <a:r>
+              <a:rPr lang="en-US" dirty="0"/>
+              <a:t>Difference in </a:t>
+            </a:r>
+            <a:r>
+              <a:rPr lang="en-US" dirty="0" err="1"/>
+              <a:t>qb</a:t>
+            </a:r>
+            <a:r>
+              <a:rPr lang="en-US" dirty="0"/>
+              <a:t> </a:t>
+            </a:r>
+            <a:r>
+              <a:rPr lang="en-US" dirty="0" err="1"/>
+              <a:t>elo</a:t>
+            </a:r>
+            <a:endParaRPr lang="en-US" dirty="0"/>
+          </a:p>
+        </p:txBody>
+      </p:sp>
+      <p:pic>
+        <p:nvPicPr>
+          <p:cNvPr id="4" name="Picture 3" descr="A graph of different colored lines&#10;&#10;Description automatically generated">
+            <a:extLst>
+              <a:ext uri="{FF2B5EF4-FFF2-40B4-BE49-F238E27FC236}">
+                <a16:creationId xmlns:a16="http://schemas.microsoft.com/office/drawing/2014/main" id="{75BB222E-6F7B-C3B6-E9A0-6A38770EF42A}"/>
+              </a:ext>
+            </a:extLst>
+          </p:cNvPr>
+          <p:cNvPicPr>
+            <a:picLocks noChangeAspect="1"/>
+          </p:cNvPicPr>
+          <p:nvPr/>
+        </p:nvPicPr>
+        <p:blipFill>
+          <a:blip r:embed="rId2"/>
+          <a:stretch>
+            <a:fillRect/>
+          </a:stretch>
+        </p:blipFill>
+        <p:spPr>
+          <a:xfrm>
+            <a:off x="1523991" y="1299078"/>
+            <a:ext cx="9144018" cy="5486411"/>
+          </a:xfrm>
+          <a:prstGeom prst="rect">
+            <a:avLst/>
+          </a:prstGeom>
+        </p:spPr>
+      </p:pic>
+    </p:spTree>
+    <p:extLst>
+      <p:ext uri="{BB962C8B-B14F-4D97-AF65-F5344CB8AC3E}">
+        <p14:creationId xmlns:p14="http://schemas.microsoft.com/office/powerpoint/2010/main" val="4282081303"/>
+      </p:ext>
+    </p:extLst>
+  </p:cSld>
+  <p:clrMapOvr>
+    <a:masterClrMapping/>
+  </p:clrMapOvr>
+</p:sld>
+</file>
+
+<file path=ppt/slides/slide21.xml><?xml version="1.0" encoding="utf-8"?>
+<p:sld xmlns:a="http://schemas.openxmlformats.org/drawingml/2006/main" xmlns:r="http://schemas.openxmlformats.org/officeDocument/2006/relationships" xmlns:p="http://schemas.openxmlformats.org/presentationml/2006/main">
+  <p:cSld>
+    <p:spTree>
+      <p:nvGrpSpPr>
+        <p:cNvPr id="1" name="">
+          <a:extLst>
+            <a:ext uri="{FF2B5EF4-FFF2-40B4-BE49-F238E27FC236}">
+              <a16:creationId xmlns:a16="http://schemas.microsoft.com/office/drawing/2014/main" id="{6B851E49-7A47-08FD-DA23-73C36F5D4985}"/>
+            </a:ext>
+          </a:extLst>
+        </p:cNvPr>
+        <p:cNvGrpSpPr/>
+        <p:nvPr/>
+      </p:nvGrpSpPr>
+      <p:grpSpPr>
+        <a:xfrm>
+          <a:off x="0" y="0"/>
+          <a:ext cx="0" cy="0"/>
+          <a:chOff x="0" y="0"/>
+          <a:chExt cx="0" cy="0"/>
+        </a:xfrm>
+      </p:grpSpPr>
+      <p:sp>
+        <p:nvSpPr>
+          <p:cNvPr id="2" name="Title 1">
+            <a:extLst>
+              <a:ext uri="{FF2B5EF4-FFF2-40B4-BE49-F238E27FC236}">
+                <a16:creationId xmlns:a16="http://schemas.microsoft.com/office/drawing/2014/main" id="{B058D734-7E33-07E2-F815-C93659055DA8}"/>
+              </a:ext>
+            </a:extLst>
+          </p:cNvPr>
+          <p:cNvSpPr>
+            <a:spLocks noGrp="1"/>
+          </p:cNvSpPr>
+          <p:nvPr>
+            <p:ph type="ctrTitle"/>
+          </p:nvPr>
+        </p:nvSpPr>
+        <p:spPr>
+          <a:xfrm>
+            <a:off x="1155032" y="72511"/>
+            <a:ext cx="9984916" cy="1069848"/>
+          </a:xfrm>
+        </p:spPr>
+        <p:txBody>
+          <a:bodyPr/>
+          <a:lstStyle/>
+          <a:p>
+            <a:r>
+              <a:rPr lang="en-US" sz="3200" dirty="0" err="1"/>
+              <a:t>Qb</a:t>
+            </a:r>
+            <a:r>
+              <a:rPr lang="en-US" sz="3200" dirty="0"/>
+              <a:t> adjusted for </a:t>
+            </a:r>
+            <a:r>
+              <a:rPr lang="en-US" sz="3200" dirty="0" err="1"/>
+              <a:t>elo</a:t>
+            </a:r>
+            <a:r>
+              <a:rPr lang="en-US" sz="3200" dirty="0"/>
+              <a:t> team 1 win probability vs actual winner</a:t>
+            </a:r>
+          </a:p>
+        </p:txBody>
+      </p:sp>
+      <p:pic>
+        <p:nvPicPr>
+          <p:cNvPr id="4" name="Picture 3" descr="A screen shot of a computer screen&#10;&#10;Description automatically generated">
+            <a:extLst>
+              <a:ext uri="{FF2B5EF4-FFF2-40B4-BE49-F238E27FC236}">
+                <a16:creationId xmlns:a16="http://schemas.microsoft.com/office/drawing/2014/main" id="{C5A0712A-352B-D852-B16E-615759FAC443}"/>
+              </a:ext>
+            </a:extLst>
+          </p:cNvPr>
+          <p:cNvPicPr>
+            <a:picLocks noChangeAspect="1"/>
+          </p:cNvPicPr>
+          <p:nvPr/>
+        </p:nvPicPr>
+        <p:blipFill>
+          <a:blip r:embed="rId2"/>
+          <a:stretch>
+            <a:fillRect/>
+          </a:stretch>
+        </p:blipFill>
+        <p:spPr>
+          <a:xfrm>
+            <a:off x="1523991" y="1371589"/>
+            <a:ext cx="9144018" cy="5486411"/>
+          </a:xfrm>
+          <a:prstGeom prst="rect">
+            <a:avLst/>
+          </a:prstGeom>
+        </p:spPr>
+      </p:pic>
+    </p:spTree>
+    <p:extLst>
+      <p:ext uri="{BB962C8B-B14F-4D97-AF65-F5344CB8AC3E}">
+        <p14:creationId xmlns:p14="http://schemas.microsoft.com/office/powerpoint/2010/main" val="3642347434"/>
+      </p:ext>
+    </p:extLst>
+  </p:cSld>
+  <p:clrMapOvr>
+    <a:masterClrMapping/>
+  </p:clrMapOvr>
+</p:sld>
+</file>
+
+<file path=ppt/slides/slide22.xml><?xml version="1.0" encoding="utf-8"?>
+<p:sld xmlns:a="http://schemas.openxmlformats.org/drawingml/2006/main" xmlns:r="http://schemas.openxmlformats.org/officeDocument/2006/relationships" xmlns:p="http://schemas.openxmlformats.org/presentationml/2006/main">
+  <p:cSld>
+    <p:spTree>
+      <p:nvGrpSpPr>
+        <p:cNvPr id="1" name="">
+          <a:extLst>
+            <a:ext uri="{FF2B5EF4-FFF2-40B4-BE49-F238E27FC236}">
+              <a16:creationId xmlns:a16="http://schemas.microsoft.com/office/drawing/2014/main" id="{020E173C-B957-2FCC-2D69-77EDB951E5B4}"/>
+            </a:ext>
+          </a:extLst>
+        </p:cNvPr>
+        <p:cNvGrpSpPr/>
+        <p:nvPr/>
+      </p:nvGrpSpPr>
+      <p:grpSpPr>
+        <a:xfrm>
+          <a:off x="0" y="0"/>
+          <a:ext cx="0" cy="0"/>
+          <a:chOff x="0" y="0"/>
+          <a:chExt cx="0" cy="0"/>
+        </a:xfrm>
+      </p:grpSpPr>
+      <p:sp>
+        <p:nvSpPr>
+          <p:cNvPr id="2" name="Title 1">
+            <a:extLst>
+              <a:ext uri="{FF2B5EF4-FFF2-40B4-BE49-F238E27FC236}">
+                <a16:creationId xmlns:a16="http://schemas.microsoft.com/office/drawing/2014/main" id="{238273A1-329D-37FA-A5B5-2790C3708193}"/>
+              </a:ext>
+            </a:extLst>
+          </p:cNvPr>
+          <p:cNvSpPr>
+            <a:spLocks noGrp="1"/>
+          </p:cNvSpPr>
+          <p:nvPr>
+            <p:ph type="ctrTitle"/>
+          </p:nvPr>
+        </p:nvSpPr>
+        <p:spPr>
+          <a:xfrm>
+            <a:off x="1155032" y="72511"/>
+            <a:ext cx="10063574" cy="1069848"/>
+          </a:xfrm>
+        </p:spPr>
+        <p:txBody>
+          <a:bodyPr/>
+          <a:lstStyle/>
+          <a:p>
+            <a:r>
+              <a:rPr lang="en-US" sz="2800" dirty="0" err="1"/>
+              <a:t>Qb</a:t>
+            </a:r>
+            <a:r>
+              <a:rPr lang="en-US" sz="2800" dirty="0"/>
+              <a:t> adjusted </a:t>
+            </a:r>
+            <a:r>
+              <a:rPr lang="en-US" sz="2800" dirty="0" err="1"/>
+              <a:t>elo</a:t>
+            </a:r>
+            <a:r>
+              <a:rPr lang="en-US" sz="2800" dirty="0"/>
+              <a:t> team 1 wins probability vs actual winner</a:t>
+            </a:r>
+          </a:p>
+        </p:txBody>
+      </p:sp>
+      <p:pic>
+        <p:nvPicPr>
+          <p:cNvPr id="4" name="Picture 3" descr="A blue and orange rectangular bars&#10;&#10;Description automatically generated">
+            <a:extLst>
+              <a:ext uri="{FF2B5EF4-FFF2-40B4-BE49-F238E27FC236}">
+                <a16:creationId xmlns:a16="http://schemas.microsoft.com/office/drawing/2014/main" id="{538BCCBC-4734-D1A2-9F7F-85F96389C27A}"/>
+              </a:ext>
+            </a:extLst>
+          </p:cNvPr>
+          <p:cNvPicPr>
+            <a:picLocks noChangeAspect="1"/>
+          </p:cNvPicPr>
+          <p:nvPr/>
+        </p:nvPicPr>
+        <p:blipFill>
+          <a:blip r:embed="rId2"/>
+          <a:stretch>
+            <a:fillRect/>
+          </a:stretch>
+        </p:blipFill>
+        <p:spPr>
+          <a:xfrm>
+            <a:off x="1523991" y="1299078"/>
+            <a:ext cx="9144018" cy="5486411"/>
+          </a:xfrm>
+          <a:prstGeom prst="rect">
+            <a:avLst/>
+          </a:prstGeom>
+        </p:spPr>
+      </p:pic>
+    </p:spTree>
+    <p:extLst>
+      <p:ext uri="{BB962C8B-B14F-4D97-AF65-F5344CB8AC3E}">
+        <p14:creationId xmlns:p14="http://schemas.microsoft.com/office/powerpoint/2010/main" val="951122994"/>
+      </p:ext>
+    </p:extLst>
+  </p:cSld>
+  <p:clrMapOvr>
+    <a:masterClrMapping/>
+  </p:clrMapOvr>
+</p:sld>
+</file>
+
+<file path=ppt/slides/slide23.xml><?xml version="1.0" encoding="utf-8"?>
+<p:sld xmlns:a="http://schemas.openxmlformats.org/drawingml/2006/main" xmlns:r="http://schemas.openxmlformats.org/officeDocument/2006/relationships" xmlns:p="http://schemas.openxmlformats.org/presentationml/2006/main">
+  <p:cSld>
+    <p:spTree>
+      <p:nvGrpSpPr>
+        <p:cNvPr id="1" name="">
+          <a:extLst>
+            <a:ext uri="{FF2B5EF4-FFF2-40B4-BE49-F238E27FC236}">
+              <a16:creationId xmlns:a16="http://schemas.microsoft.com/office/drawing/2014/main" id="{B563952B-E7A6-7740-701F-9C4CC0209D30}"/>
+            </a:ext>
+          </a:extLst>
+        </p:cNvPr>
+        <p:cNvGrpSpPr/>
+        <p:nvPr/>
+      </p:nvGrpSpPr>
+      <p:grpSpPr>
+        <a:xfrm>
+          <a:off x="0" y="0"/>
+          <a:ext cx="0" cy="0"/>
+          <a:chOff x="0" y="0"/>
+          <a:chExt cx="0" cy="0"/>
+        </a:xfrm>
+      </p:grpSpPr>
+      <p:sp>
+        <p:nvSpPr>
+          <p:cNvPr id="2" name="Title 1">
+            <a:extLst>
+              <a:ext uri="{FF2B5EF4-FFF2-40B4-BE49-F238E27FC236}">
+                <a16:creationId xmlns:a16="http://schemas.microsoft.com/office/drawing/2014/main" id="{1E67CD56-4CE1-38D4-5C34-2813E0F8BD5F}"/>
+              </a:ext>
+            </a:extLst>
+          </p:cNvPr>
+          <p:cNvSpPr>
+            <a:spLocks noGrp="1"/>
+          </p:cNvSpPr>
+          <p:nvPr>
+            <p:ph type="ctrTitle"/>
+          </p:nvPr>
+        </p:nvSpPr>
+        <p:spPr>
+          <a:xfrm>
+            <a:off x="1155031" y="72511"/>
+            <a:ext cx="9837433" cy="1069848"/>
+          </a:xfrm>
+        </p:spPr>
+        <p:txBody>
+          <a:bodyPr/>
+          <a:lstStyle/>
+          <a:p>
+            <a:r>
+              <a:rPr lang="en-US" sz="2800" dirty="0" err="1"/>
+              <a:t>Qb</a:t>
+            </a:r>
+            <a:r>
+              <a:rPr lang="en-US" sz="2800" dirty="0"/>
+              <a:t> adjusted </a:t>
+            </a:r>
+            <a:r>
+              <a:rPr lang="en-US" sz="2800" dirty="0" err="1"/>
+              <a:t>elo</a:t>
+            </a:r>
+            <a:r>
+              <a:rPr lang="en-US" sz="2800" dirty="0"/>
+              <a:t> team 2 wins probability vs actual winner</a:t>
+            </a:r>
+          </a:p>
+        </p:txBody>
+      </p:sp>
+      <p:pic>
+        <p:nvPicPr>
+          <p:cNvPr id="4" name="Picture 3" descr="A screen shot of a computer screen&#10;&#10;Description automatically generated">
+            <a:extLst>
+              <a:ext uri="{FF2B5EF4-FFF2-40B4-BE49-F238E27FC236}">
+                <a16:creationId xmlns:a16="http://schemas.microsoft.com/office/drawing/2014/main" id="{C701BAB4-7437-338D-2085-8008D6D0B24C}"/>
+              </a:ext>
+            </a:extLst>
+          </p:cNvPr>
+          <p:cNvPicPr>
+            <a:picLocks noChangeAspect="1"/>
+          </p:cNvPicPr>
+          <p:nvPr/>
+        </p:nvPicPr>
+        <p:blipFill>
+          <a:blip r:embed="rId2"/>
+          <a:stretch>
+            <a:fillRect/>
+          </a:stretch>
+        </p:blipFill>
+        <p:spPr>
+          <a:xfrm>
+            <a:off x="2005772" y="1826342"/>
+            <a:ext cx="7914977" cy="4748986"/>
+          </a:xfrm>
+          <a:prstGeom prst="rect">
+            <a:avLst/>
+          </a:prstGeom>
+        </p:spPr>
+      </p:pic>
+      <p:pic>
+        <p:nvPicPr>
+          <p:cNvPr id="6" name="Picture 5" descr="A blue and orange squares&#10;&#10;Description automatically generated">
+            <a:extLst>
+              <a:ext uri="{FF2B5EF4-FFF2-40B4-BE49-F238E27FC236}">
+                <a16:creationId xmlns:a16="http://schemas.microsoft.com/office/drawing/2014/main" id="{5EFBDCAD-7718-1103-6E67-B849B9FCFB6A}"/>
+              </a:ext>
+            </a:extLst>
+          </p:cNvPr>
+          <p:cNvPicPr>
+            <a:picLocks noChangeAspect="1"/>
+          </p:cNvPicPr>
+          <p:nvPr/>
+        </p:nvPicPr>
+        <p:blipFill>
+          <a:blip r:embed="rId3"/>
+          <a:stretch>
+            <a:fillRect/>
+          </a:stretch>
+        </p:blipFill>
+        <p:spPr>
+          <a:xfrm>
+            <a:off x="1523991" y="1299077"/>
+            <a:ext cx="9144018" cy="5486411"/>
+          </a:xfrm>
+          <a:prstGeom prst="rect">
+            <a:avLst/>
+          </a:prstGeom>
+        </p:spPr>
+      </p:pic>
+    </p:spTree>
+    <p:extLst>
+      <p:ext uri="{BB962C8B-B14F-4D97-AF65-F5344CB8AC3E}">
+        <p14:creationId xmlns:p14="http://schemas.microsoft.com/office/powerpoint/2010/main" val="3859031446"/>
+      </p:ext>
+    </p:extLst>
+  </p:cSld>
+  <p:clrMapOvr>
+    <a:masterClrMapping/>
+  </p:clrMapOvr>
+</p:sld>
+</file>
+
+<file path=ppt/slides/slide24.xml><?xml version="1.0" encoding="utf-8"?>
+<p:sld xmlns:a="http://schemas.openxmlformats.org/drawingml/2006/main" xmlns:r="http://schemas.openxmlformats.org/officeDocument/2006/relationships" xmlns:p="http://schemas.openxmlformats.org/presentationml/2006/main">
+  <p:cSld>
+    <p:spTree>
+      <p:nvGrpSpPr>
+        <p:cNvPr id="1" name="">
+          <a:extLst>
+            <a:ext uri="{FF2B5EF4-FFF2-40B4-BE49-F238E27FC236}">
+              <a16:creationId xmlns:a16="http://schemas.microsoft.com/office/drawing/2014/main" id="{E364A828-F6A4-346A-BBD5-E12D0403D851}"/>
+            </a:ext>
+          </a:extLst>
+        </p:cNvPr>
+        <p:cNvGrpSpPr/>
+        <p:nvPr/>
+      </p:nvGrpSpPr>
+      <p:grpSpPr>
+        <a:xfrm>
+          <a:off x="0" y="0"/>
+          <a:ext cx="0" cy="0"/>
+          <a:chOff x="0" y="0"/>
+          <a:chExt cx="0" cy="0"/>
+        </a:xfrm>
+      </p:grpSpPr>
+      <p:sp>
+        <p:nvSpPr>
+          <p:cNvPr id="2" name="Title 1">
+            <a:extLst>
+              <a:ext uri="{FF2B5EF4-FFF2-40B4-BE49-F238E27FC236}">
+                <a16:creationId xmlns:a16="http://schemas.microsoft.com/office/drawing/2014/main" id="{12A62508-F905-CB16-2349-FAA3E2BB3BC7}"/>
+              </a:ext>
+            </a:extLst>
+          </p:cNvPr>
+          <p:cNvSpPr>
+            <a:spLocks noGrp="1"/>
+          </p:cNvSpPr>
+          <p:nvPr>
+            <p:ph type="ctrTitle"/>
+          </p:nvPr>
+        </p:nvSpPr>
+        <p:spPr>
+          <a:xfrm>
+            <a:off x="1155032" y="72511"/>
+            <a:ext cx="8568248" cy="1069848"/>
+          </a:xfrm>
+        </p:spPr>
+        <p:txBody>
+          <a:bodyPr/>
+          <a:lstStyle/>
+          <a:p>
+            <a:r>
+              <a:rPr lang="en-US" dirty="0"/>
+              <a:t>Graph Placeholder</a:t>
+            </a:r>
+          </a:p>
+        </p:txBody>
+      </p:sp>
+    </p:spTree>
+    <p:extLst>
+      <p:ext uri="{BB962C8B-B14F-4D97-AF65-F5344CB8AC3E}">
+        <p14:creationId xmlns:p14="http://schemas.microsoft.com/office/powerpoint/2010/main" val="1923138224"/>
+      </p:ext>
+    </p:extLst>
+  </p:cSld>
+  <p:clrMapOvr>
+    <a:masterClrMapping/>
+  </p:clrMapOvr>
+</p:sld>
+</file>
+
+<file path=ppt/slides/slide25.xml><?xml version="1.0" encoding="utf-8"?>
+<p:sld xmlns:a="http://schemas.openxmlformats.org/drawingml/2006/main" xmlns:r="http://schemas.openxmlformats.org/officeDocument/2006/relationships" xmlns:p="http://schemas.openxmlformats.org/presentationml/2006/main">
+  <p:cSld>
+    <p:spTree>
+      <p:nvGrpSpPr>
+        <p:cNvPr id="1" name="">
+          <a:extLst>
+            <a:ext uri="{FF2B5EF4-FFF2-40B4-BE49-F238E27FC236}">
+              <a16:creationId xmlns:a16="http://schemas.microsoft.com/office/drawing/2014/main" id="{FF2E94FD-F10E-263E-9261-584FEE2190D4}"/>
+            </a:ext>
+          </a:extLst>
+        </p:cNvPr>
+        <p:cNvGrpSpPr/>
+        <p:nvPr/>
+      </p:nvGrpSpPr>
+      <p:grpSpPr>
+        <a:xfrm>
+          <a:off x="0" y="0"/>
+          <a:ext cx="0" cy="0"/>
+          <a:chOff x="0" y="0"/>
+          <a:chExt cx="0" cy="0"/>
+        </a:xfrm>
+      </p:grpSpPr>
+      <p:sp>
+        <p:nvSpPr>
+          <p:cNvPr id="2" name="Title 1">
+            <a:extLst>
+              <a:ext uri="{FF2B5EF4-FFF2-40B4-BE49-F238E27FC236}">
+                <a16:creationId xmlns:a16="http://schemas.microsoft.com/office/drawing/2014/main" id="{8A6A3625-685D-E948-48D9-5895794E22AC}"/>
+              </a:ext>
+            </a:extLst>
+          </p:cNvPr>
+          <p:cNvSpPr>
+            <a:spLocks noGrp="1"/>
+          </p:cNvSpPr>
+          <p:nvPr>
+            <p:ph type="ctrTitle"/>
+          </p:nvPr>
+        </p:nvSpPr>
+        <p:spPr>
+          <a:xfrm>
+            <a:off x="1155031" y="72511"/>
+            <a:ext cx="10152065" cy="1069848"/>
+          </a:xfrm>
+        </p:spPr>
+        <p:txBody>
+          <a:bodyPr/>
+          <a:lstStyle/>
+          <a:p>
+            <a:r>
+              <a:rPr lang="en-US" dirty="0"/>
+              <a:t>Graph placeholder</a:t>
+            </a:r>
+          </a:p>
+        </p:txBody>
+      </p:sp>
+    </p:spTree>
+    <p:extLst>
+      <p:ext uri="{BB962C8B-B14F-4D97-AF65-F5344CB8AC3E}">
+        <p14:creationId xmlns:p14="http://schemas.microsoft.com/office/powerpoint/2010/main" val="3410750719"/>
+      </p:ext>
+    </p:extLst>
+  </p:cSld>
+  <p:clrMapOvr>
+    <a:masterClrMapping/>
+  </p:clrMapOvr>
+</p:sld>
+</file>
+
+<file path=ppt/slides/slide26.xml><?xml version="1.0" encoding="utf-8"?>
+<p:sld xmlns:a="http://schemas.openxmlformats.org/drawingml/2006/main" xmlns:r="http://schemas.openxmlformats.org/officeDocument/2006/relationships" xmlns:p="http://schemas.openxmlformats.org/presentationml/2006/main">
+  <p:cSld>
+    <p:spTree>
+      <p:nvGrpSpPr>
+        <p:cNvPr id="1" name="">
+          <a:extLst>
+            <a:ext uri="{FF2B5EF4-FFF2-40B4-BE49-F238E27FC236}">
+              <a16:creationId xmlns:a16="http://schemas.microsoft.com/office/drawing/2014/main" id="{6B7D5307-F546-68F2-09BC-C15C1F7CDB91}"/>
+            </a:ext>
+          </a:extLst>
+        </p:cNvPr>
+        <p:cNvGrpSpPr/>
+        <p:nvPr/>
+      </p:nvGrpSpPr>
+      <p:grpSpPr>
+        <a:xfrm>
+          <a:off x="0" y="0"/>
+          <a:ext cx="0" cy="0"/>
+          <a:chOff x="0" y="0"/>
+          <a:chExt cx="0" cy="0"/>
+        </a:xfrm>
+      </p:grpSpPr>
+      <p:sp>
+        <p:nvSpPr>
+          <p:cNvPr id="2" name="Title 1">
+            <a:extLst>
+              <a:ext uri="{FF2B5EF4-FFF2-40B4-BE49-F238E27FC236}">
+                <a16:creationId xmlns:a16="http://schemas.microsoft.com/office/drawing/2014/main" id="{6C65CB55-A7C3-287A-C181-76AE45EF3ADE}"/>
+              </a:ext>
+            </a:extLst>
+          </p:cNvPr>
+          <p:cNvSpPr>
+            <a:spLocks noGrp="1"/>
+          </p:cNvSpPr>
+          <p:nvPr>
+            <p:ph type="ctrTitle"/>
+          </p:nvPr>
+        </p:nvSpPr>
+        <p:spPr>
+          <a:xfrm>
+            <a:off x="1155031" y="72511"/>
+            <a:ext cx="10004581" cy="1069848"/>
+          </a:xfrm>
+        </p:spPr>
+        <p:txBody>
+          <a:bodyPr/>
+          <a:lstStyle/>
+          <a:p>
+            <a:r>
+              <a:rPr lang="en-US" dirty="0"/>
+              <a:t>Graph placeholder</a:t>
+            </a:r>
+          </a:p>
+        </p:txBody>
+      </p:sp>
+    </p:spTree>
+    <p:extLst>
+      <p:ext uri="{BB962C8B-B14F-4D97-AF65-F5344CB8AC3E}">
+        <p14:creationId xmlns:p14="http://schemas.microsoft.com/office/powerpoint/2010/main" val="500745122"/>
+      </p:ext>
+    </p:extLst>
+  </p:cSld>
+  <p:clrMapOvr>
+    <a:masterClrMapping/>
+  </p:clrMapOvr>
+</p:sld>
+</file>
+
+<file path=ppt/slides/slide27.xml><?xml version="1.0" encoding="utf-8"?>
+<p:sld xmlns:a="http://schemas.openxmlformats.org/drawingml/2006/main" xmlns:r="http://schemas.openxmlformats.org/officeDocument/2006/relationships" xmlns:p="http://schemas.openxmlformats.org/presentationml/2006/main">
+  <p:cSld>
+    <p:spTree>
+      <p:nvGrpSpPr>
+        <p:cNvPr id="1" name="">
+          <a:extLst>
+            <a:ext uri="{FF2B5EF4-FFF2-40B4-BE49-F238E27FC236}">
+              <a16:creationId xmlns:a16="http://schemas.microsoft.com/office/drawing/2014/main" id="{967885AA-9372-AF86-B6BA-15DFE3704374}"/>
+            </a:ext>
+          </a:extLst>
+        </p:cNvPr>
+        <p:cNvGrpSpPr/>
+        <p:nvPr/>
+      </p:nvGrpSpPr>
+      <p:grpSpPr>
+        <a:xfrm>
+          <a:off x="0" y="0"/>
+          <a:ext cx="0" cy="0"/>
+          <a:chOff x="0" y="0"/>
+          <a:chExt cx="0" cy="0"/>
+        </a:xfrm>
+      </p:grpSpPr>
+      <p:sp>
+        <p:nvSpPr>
+          <p:cNvPr id="2" name="Title 1">
+            <a:extLst>
+              <a:ext uri="{FF2B5EF4-FFF2-40B4-BE49-F238E27FC236}">
+                <a16:creationId xmlns:a16="http://schemas.microsoft.com/office/drawing/2014/main" id="{4B9E3436-223B-02A7-55F9-7A1CAEE256C6}"/>
+              </a:ext>
+            </a:extLst>
+          </p:cNvPr>
+          <p:cNvSpPr>
+            <a:spLocks noGrp="1"/>
+          </p:cNvSpPr>
+          <p:nvPr>
+            <p:ph type="ctrTitle"/>
+          </p:nvPr>
+        </p:nvSpPr>
+        <p:spPr>
+          <a:xfrm>
+            <a:off x="1155032" y="72511"/>
+            <a:ext cx="8568248" cy="1069848"/>
+          </a:xfrm>
+        </p:spPr>
+        <p:txBody>
+          <a:bodyPr/>
+          <a:lstStyle/>
+          <a:p>
+            <a:r>
+              <a:rPr lang="en-US" dirty="0"/>
+              <a:t>Graph - placeholder</a:t>
+            </a:r>
+          </a:p>
+        </p:txBody>
+      </p:sp>
+    </p:spTree>
+    <p:extLst>
+      <p:ext uri="{BB962C8B-B14F-4D97-AF65-F5344CB8AC3E}">
+        <p14:creationId xmlns:p14="http://schemas.microsoft.com/office/powerpoint/2010/main" val="3681476119"/>
+      </p:ext>
+    </p:extLst>
+  </p:cSld>
+  <p:clrMapOvr>
+    <a:masterClrMapping/>
+  </p:clrMapOvr>
+</p:sld>
+</file>
+
+<file path=ppt/slides/slide28.xml><?xml version="1.0" encoding="utf-8"?>
+<p:sld xmlns:a="http://schemas.openxmlformats.org/drawingml/2006/main" xmlns:r="http://schemas.openxmlformats.org/officeDocument/2006/relationships" xmlns:p="http://schemas.openxmlformats.org/presentationml/2006/main">
+  <p:cSld>
+    <p:spTree>
+      <p:nvGrpSpPr>
+        <p:cNvPr id="1" name=""/>
+        <p:cNvGrpSpPr/>
+        <p:nvPr/>
+      </p:nvGrpSpPr>
+      <p:grpSpPr>
+        <a:xfrm>
+          <a:off x="0" y="0"/>
+          <a:ext cx="0" cy="0"/>
+          <a:chOff x="0" y="0"/>
+          <a:chExt cx="0" cy="0"/>
+        </a:xfrm>
+      </p:grpSpPr>
+      <p:sp>
+        <p:nvSpPr>
+          <p:cNvPr id="2" name="Title 1">
+            <a:extLst>
+              <a:ext uri="{FF2B5EF4-FFF2-40B4-BE49-F238E27FC236}">
+                <a16:creationId xmlns:a16="http://schemas.microsoft.com/office/drawing/2014/main" id="{F41F0E99-07CC-9576-AFD7-C52151AD0EA3}"/>
+              </a:ext>
+            </a:extLst>
+          </p:cNvPr>
+          <p:cNvSpPr>
+            <a:spLocks noGrp="1"/>
+          </p:cNvSpPr>
+          <p:nvPr>
+            <p:ph type="ctrTitle"/>
+          </p:nvPr>
+        </p:nvSpPr>
+        <p:spPr>
+          <a:xfrm>
+            <a:off x="1987455" y="72511"/>
+            <a:ext cx="8776797" cy="1069848"/>
+          </a:xfrm>
+        </p:spPr>
+        <p:txBody>
+          <a:bodyPr/>
+          <a:lstStyle/>
+          <a:p>
+            <a:r>
+              <a:rPr lang="en-US" dirty="0"/>
+              <a:t>Findings and implications</a:t>
+            </a:r>
+          </a:p>
+        </p:txBody>
+      </p:sp>
+      <p:sp>
+        <p:nvSpPr>
+          <p:cNvPr id="3" name="Subtitle 2">
+            <a:extLst>
+              <a:ext uri="{FF2B5EF4-FFF2-40B4-BE49-F238E27FC236}">
+                <a16:creationId xmlns:a16="http://schemas.microsoft.com/office/drawing/2014/main" id="{5A82A8B0-333F-633E-3FA7-D38DBFB10971}"/>
+              </a:ext>
+            </a:extLst>
+          </p:cNvPr>
+          <p:cNvSpPr>
+            <a:spLocks noGrp="1"/>
+          </p:cNvSpPr>
+          <p:nvPr>
+            <p:ph type="subTitle" idx="1"/>
+          </p:nvPr>
+        </p:nvSpPr>
+        <p:spPr>
+          <a:xfrm>
+            <a:off x="505325" y="1259305"/>
+            <a:ext cx="11269579" cy="5430253"/>
+          </a:xfrm>
+        </p:spPr>
+        <p:txBody>
+          <a:bodyPr/>
+          <a:lstStyle/>
+          <a:p>
+            <a:br>
+              <a:rPr lang="en-US" sz="2800" b="0" dirty="0">
+                <a:solidFill>
+                  <a:srgbClr val="CCCCCC"/>
+                </a:solidFill>
+                <a:effectLst/>
+                <a:latin typeface="Consolas" panose="020B0609020204030204" pitchFamily="49" charset="0"/>
+              </a:rPr>
+            </a:br>
+            <a:endParaRPr lang="en-US" sz="2800" b="0" dirty="0">
+              <a:solidFill>
+                <a:srgbClr val="CCCCCC"/>
+              </a:solidFill>
+              <a:effectLst/>
+              <a:latin typeface="Consolas" panose="020B0609020204030204" pitchFamily="49" charset="0"/>
+            </a:endParaRPr>
+          </a:p>
+          <a:p>
+            <a:endParaRPr lang="en-US" dirty="0"/>
+          </a:p>
+        </p:txBody>
+      </p:sp>
+    </p:spTree>
+    <p:extLst>
+      <p:ext uri="{BB962C8B-B14F-4D97-AF65-F5344CB8AC3E}">
+        <p14:creationId xmlns:p14="http://schemas.microsoft.com/office/powerpoint/2010/main" val="4174470146"/>
+      </p:ext>
+    </p:extLst>
+  </p:cSld>
+  <p:clrMapOvr>
+    <a:masterClrMapping/>
+  </p:clrMapOvr>
+</p:sld>
+</file>
+
+<file path=ppt/slides/slide29.xml><?xml version="1.0" encoding="utf-8"?>
+<p:sld xmlns:a="http://schemas.openxmlformats.org/drawingml/2006/main" xmlns:r="http://schemas.openxmlformats.org/officeDocument/2006/relationships" xmlns:p="http://schemas.openxmlformats.org/presentationml/2006/main">
+  <p:cSld>
+    <p:spTree>
+      <p:nvGrpSpPr>
+        <p:cNvPr id="1" name=""/>
+        <p:cNvGrpSpPr/>
+        <p:nvPr/>
+      </p:nvGrpSpPr>
+      <p:grpSpPr>
+        <a:xfrm>
+          <a:off x="0" y="0"/>
+          <a:ext cx="0" cy="0"/>
+          <a:chOff x="0" y="0"/>
+          <a:chExt cx="0" cy="0"/>
+        </a:xfrm>
+      </p:grpSpPr>
+      <p:sp>
+        <p:nvSpPr>
+          <p:cNvPr id="2" name="Title 1">
+            <a:extLst>
+              <a:ext uri="{FF2B5EF4-FFF2-40B4-BE49-F238E27FC236}">
+                <a16:creationId xmlns:a16="http://schemas.microsoft.com/office/drawing/2014/main" id="{F41F0E99-07CC-9576-AFD7-C52151AD0EA3}"/>
+              </a:ext>
+            </a:extLst>
+          </p:cNvPr>
+          <p:cNvSpPr>
+            <a:spLocks noGrp="1"/>
+          </p:cNvSpPr>
+          <p:nvPr>
+            <p:ph type="ctrTitle"/>
+          </p:nvPr>
+        </p:nvSpPr>
+        <p:spPr>
+          <a:xfrm>
+            <a:off x="1987456" y="72511"/>
+            <a:ext cx="8937218" cy="1069848"/>
+          </a:xfrm>
+        </p:spPr>
+        <p:txBody>
+          <a:bodyPr/>
+          <a:lstStyle/>
+          <a:p>
+            <a:r>
+              <a:rPr lang="en-US" dirty="0"/>
+              <a:t>Software version control</a:t>
+            </a:r>
+          </a:p>
+        </p:txBody>
+      </p:sp>
+      <p:sp>
+        <p:nvSpPr>
+          <p:cNvPr id="3" name="Subtitle 2">
+            <a:extLst>
+              <a:ext uri="{FF2B5EF4-FFF2-40B4-BE49-F238E27FC236}">
+                <a16:creationId xmlns:a16="http://schemas.microsoft.com/office/drawing/2014/main" id="{5A82A8B0-333F-633E-3FA7-D38DBFB10971}"/>
+              </a:ext>
+            </a:extLst>
+          </p:cNvPr>
+          <p:cNvSpPr>
+            <a:spLocks noGrp="1"/>
+          </p:cNvSpPr>
+          <p:nvPr>
+            <p:ph type="subTitle" idx="1"/>
+          </p:nvPr>
+        </p:nvSpPr>
+        <p:spPr>
+          <a:xfrm>
+            <a:off x="505325" y="1259305"/>
+            <a:ext cx="11269579" cy="5430253"/>
+          </a:xfrm>
+        </p:spPr>
+        <p:txBody>
+          <a:bodyPr/>
+          <a:lstStyle/>
+          <a:p>
+            <a:pPr marL="457200" indent="-457200" algn="l">
+              <a:buFont typeface="Arial" panose="020B0604020202020204" pitchFamily="34" charset="0"/>
+              <a:buChar char="•"/>
+            </a:pPr>
+            <a:r>
+              <a:rPr lang="en-US" sz="2800" b="0" dirty="0">
+                <a:solidFill>
+                  <a:srgbClr val="CCCCCC"/>
+                </a:solidFill>
+                <a:effectLst/>
+                <a:latin typeface="Consolas" panose="020B0609020204030204" pitchFamily="49" charset="0"/>
+              </a:rPr>
+              <a:t>Created a GitHub repository.</a:t>
+            </a:r>
+          </a:p>
+          <a:p>
+            <a:pPr marL="457200" indent="-457200" algn="l">
+              <a:buFont typeface="Arial" panose="020B0604020202020204" pitchFamily="34" charset="0"/>
+              <a:buChar char="•"/>
+            </a:pPr>
+            <a:r>
+              <a:rPr lang="en-US" sz="2800" b="0" dirty="0">
+                <a:solidFill>
+                  <a:srgbClr val="CCCCCC"/>
+                </a:solidFill>
+                <a:effectLst/>
+                <a:latin typeface="Consolas" panose="020B0609020204030204" pitchFamily="49" charset="0"/>
+              </a:rPr>
+              <a:t>Members of the group added</a:t>
+            </a:r>
+            <a:r>
+              <a:rPr lang="en-US" sz="2800" dirty="0">
+                <a:solidFill>
+                  <a:srgbClr val="CCCCCC"/>
+                </a:solidFill>
+                <a:latin typeface="Consolas" panose="020B0609020204030204" pitchFamily="49" charset="0"/>
+              </a:rPr>
+              <a:t>/edited to repository</a:t>
+            </a:r>
+            <a:r>
+              <a:rPr lang="en-US" sz="2800" b="0" dirty="0">
+                <a:solidFill>
+                  <a:srgbClr val="CCCCCC"/>
+                </a:solidFill>
+                <a:effectLst/>
+                <a:latin typeface="Consolas" panose="020B0609020204030204" pitchFamily="49" charset="0"/>
+              </a:rPr>
+              <a:t>.</a:t>
+            </a:r>
+          </a:p>
+          <a:p>
+            <a:pPr marL="457200" indent="-457200" algn="l">
+              <a:buFont typeface="Arial" panose="020B0604020202020204" pitchFamily="34" charset="0"/>
+              <a:buChar char="•"/>
+            </a:pPr>
+            <a:r>
+              <a:rPr lang="en-US" sz="2800" b="0" dirty="0">
+                <a:solidFill>
+                  <a:srgbClr val="CCCCCC"/>
+                </a:solidFill>
+                <a:effectLst/>
+                <a:latin typeface="Consolas" panose="020B0609020204030204" pitchFamily="49" charset="0"/>
+              </a:rPr>
+              <a:t>Multiple files uploaded to repository by group members in support of findings.</a:t>
+            </a:r>
+          </a:p>
+          <a:p>
+            <a:endParaRPr lang="en-US" dirty="0"/>
+          </a:p>
+        </p:txBody>
+      </p:sp>
+    </p:spTree>
+    <p:extLst>
+      <p:ext uri="{BB962C8B-B14F-4D97-AF65-F5344CB8AC3E}">
+        <p14:creationId xmlns:p14="http://schemas.microsoft.com/office/powerpoint/2010/main" val="4153323784"/>
       </p:ext>
     </p:extLst>
   </p:cSld>
@@ -18563,6 +19811,236 @@
 </p:sld>
 </file>
 
+<file path=ppt/slides/slide30.xml><?xml version="1.0" encoding="utf-8"?>
+<p:sld xmlns:a="http://schemas.openxmlformats.org/drawingml/2006/main" xmlns:r="http://schemas.openxmlformats.org/officeDocument/2006/relationships" xmlns:p="http://schemas.openxmlformats.org/presentationml/2006/main">
+  <p:cSld>
+    <p:spTree>
+      <p:nvGrpSpPr>
+        <p:cNvPr id="1" name=""/>
+        <p:cNvGrpSpPr/>
+        <p:nvPr/>
+      </p:nvGrpSpPr>
+      <p:grpSpPr>
+        <a:xfrm>
+          <a:off x="0" y="0"/>
+          <a:ext cx="0" cy="0"/>
+          <a:chOff x="0" y="0"/>
+          <a:chExt cx="0" cy="0"/>
+        </a:xfrm>
+      </p:grpSpPr>
+      <p:sp>
+        <p:nvSpPr>
+          <p:cNvPr id="2" name="Title 1">
+            <a:extLst>
+              <a:ext uri="{FF2B5EF4-FFF2-40B4-BE49-F238E27FC236}">
+                <a16:creationId xmlns:a16="http://schemas.microsoft.com/office/drawing/2014/main" id="{F41F0E99-07CC-9576-AFD7-C52151AD0EA3}"/>
+              </a:ext>
+            </a:extLst>
+          </p:cNvPr>
+          <p:cNvSpPr>
+            <a:spLocks noGrp="1"/>
+          </p:cNvSpPr>
+          <p:nvPr>
+            <p:ph type="ctrTitle"/>
+          </p:nvPr>
+        </p:nvSpPr>
+        <p:spPr>
+          <a:xfrm>
+            <a:off x="1987456" y="72511"/>
+            <a:ext cx="7735824" cy="1069848"/>
+          </a:xfrm>
+        </p:spPr>
+        <p:txBody>
+          <a:bodyPr/>
+          <a:lstStyle/>
+          <a:p>
+            <a:r>
+              <a:rPr lang="en-US" dirty="0"/>
+              <a:t>Future development</a:t>
+            </a:r>
+          </a:p>
+        </p:txBody>
+      </p:sp>
+      <p:sp>
+        <p:nvSpPr>
+          <p:cNvPr id="3" name="Subtitle 2">
+            <a:extLst>
+              <a:ext uri="{FF2B5EF4-FFF2-40B4-BE49-F238E27FC236}">
+                <a16:creationId xmlns:a16="http://schemas.microsoft.com/office/drawing/2014/main" id="{5A82A8B0-333F-633E-3FA7-D38DBFB10971}"/>
+              </a:ext>
+            </a:extLst>
+          </p:cNvPr>
+          <p:cNvSpPr>
+            <a:spLocks noGrp="1"/>
+          </p:cNvSpPr>
+          <p:nvPr>
+            <p:ph type="subTitle" idx="1"/>
+          </p:nvPr>
+        </p:nvSpPr>
+        <p:spPr>
+          <a:xfrm>
+            <a:off x="505325" y="1259305"/>
+            <a:ext cx="11269579" cy="5430253"/>
+          </a:xfrm>
+        </p:spPr>
+        <p:txBody>
+          <a:bodyPr/>
+          <a:lstStyle/>
+          <a:p>
+            <a:pPr marL="457200" indent="-457200" algn="l">
+              <a:buFont typeface="Arial" panose="020B0604020202020204" pitchFamily="34" charset="0"/>
+              <a:buChar char="•"/>
+            </a:pPr>
+            <a:r>
+              <a:rPr lang="en-US" sz="2800" b="0" dirty="0">
+                <a:solidFill>
+                  <a:srgbClr val="CCCCCC"/>
+                </a:solidFill>
+                <a:effectLst/>
+                <a:latin typeface="Consolas" panose="020B0609020204030204" pitchFamily="49" charset="0"/>
+              </a:rPr>
+              <a:t>Methodology/ELO Rating and calculation can be applied to any head-to-head match.</a:t>
+            </a:r>
+          </a:p>
+          <a:p>
+            <a:pPr marL="457200" indent="-457200" algn="l">
+              <a:buFont typeface="Arial" panose="020B0604020202020204" pitchFamily="34" charset="0"/>
+              <a:buChar char="•"/>
+            </a:pPr>
+            <a:r>
+              <a:rPr lang="en-US" sz="2800" dirty="0">
+                <a:solidFill>
+                  <a:srgbClr val="CCCCCC"/>
+                </a:solidFill>
+                <a:latin typeface="Consolas" panose="020B0609020204030204" pitchFamily="49" charset="0"/>
+              </a:rPr>
+              <a:t>This can provide predictive participants with a slight edge mathematically.</a:t>
+            </a:r>
+          </a:p>
+          <a:p>
+            <a:pPr marL="457200" indent="-457200" algn="l">
+              <a:buFont typeface="Arial" panose="020B0604020202020204" pitchFamily="34" charset="0"/>
+              <a:buChar char="•"/>
+            </a:pPr>
+            <a:r>
+              <a:rPr lang="en-US" sz="2800" b="0" dirty="0">
+                <a:solidFill>
+                  <a:srgbClr val="CCCCCC"/>
+                </a:solidFill>
+                <a:effectLst/>
+                <a:latin typeface="Consolas" panose="020B0609020204030204" pitchFamily="49" charset="0"/>
+              </a:rPr>
+              <a:t>This edge can also be combined with standard observation factors along with momentum to provide a substantial indication of a predictive “win”.</a:t>
+            </a:r>
+          </a:p>
+          <a:p>
+            <a:pPr marL="457200" indent="-457200" algn="l">
+              <a:buFont typeface="Arial" panose="020B0604020202020204" pitchFamily="34" charset="0"/>
+              <a:buChar char="•"/>
+            </a:pPr>
+            <a:r>
+              <a:rPr lang="en-US" sz="2800" dirty="0">
+                <a:solidFill>
+                  <a:srgbClr val="CCCCCC"/>
+                </a:solidFill>
+                <a:latin typeface="Consolas" panose="020B0609020204030204" pitchFamily="49" charset="0"/>
+              </a:rPr>
+              <a:t>This can be applied not only to sports but to societal events such as an election.</a:t>
+            </a:r>
+            <a:endParaRPr lang="en-US" sz="2800" b="0" dirty="0">
+              <a:solidFill>
+                <a:srgbClr val="CCCCCC"/>
+              </a:solidFill>
+              <a:effectLst/>
+              <a:latin typeface="Consolas" panose="020B0609020204030204" pitchFamily="49" charset="0"/>
+            </a:endParaRPr>
+          </a:p>
+          <a:p>
+            <a:endParaRPr lang="en-US" dirty="0"/>
+          </a:p>
+        </p:txBody>
+      </p:sp>
+    </p:spTree>
+    <p:extLst>
+      <p:ext uri="{BB962C8B-B14F-4D97-AF65-F5344CB8AC3E}">
+        <p14:creationId xmlns:p14="http://schemas.microsoft.com/office/powerpoint/2010/main" val="87203755"/>
+      </p:ext>
+    </p:extLst>
+  </p:cSld>
+  <p:clrMapOvr>
+    <a:masterClrMapping/>
+  </p:clrMapOvr>
+</p:sld>
+</file>
+
+<file path=ppt/slides/slide31.xml><?xml version="1.0" encoding="utf-8"?>
+<p:sld xmlns:a="http://schemas.openxmlformats.org/drawingml/2006/main" xmlns:r="http://schemas.openxmlformats.org/officeDocument/2006/relationships" xmlns:p="http://schemas.openxmlformats.org/presentationml/2006/main">
+  <p:cSld>
+    <p:spTree>
+      <p:nvGrpSpPr>
+        <p:cNvPr id="1" name=""/>
+        <p:cNvGrpSpPr/>
+        <p:nvPr/>
+      </p:nvGrpSpPr>
+      <p:grpSpPr>
+        <a:xfrm>
+          <a:off x="0" y="0"/>
+          <a:ext cx="0" cy="0"/>
+          <a:chOff x="0" y="0"/>
+          <a:chExt cx="0" cy="0"/>
+        </a:xfrm>
+      </p:grpSpPr>
+      <p:sp>
+        <p:nvSpPr>
+          <p:cNvPr id="2" name="Title 1">
+            <a:extLst>
+              <a:ext uri="{FF2B5EF4-FFF2-40B4-BE49-F238E27FC236}">
+                <a16:creationId xmlns:a16="http://schemas.microsoft.com/office/drawing/2014/main" id="{2C9E1892-81E6-551C-7B5A-DEA68224520B}"/>
+              </a:ext>
+            </a:extLst>
+          </p:cNvPr>
+          <p:cNvSpPr>
+            <a:spLocks noGrp="1"/>
+          </p:cNvSpPr>
+          <p:nvPr>
+            <p:ph type="title"/>
+          </p:nvPr>
+        </p:nvSpPr>
+        <p:spPr/>
+        <p:txBody>
+          <a:bodyPr/>
+          <a:lstStyle/>
+          <a:p>
+            <a:r>
+              <a:rPr lang="en-US" sz="4800" b="1" spc="600" dirty="0">
+                <a:ln w="28575">
+                  <a:noFill/>
+                  <a:prstDash val="solid"/>
+                </a:ln>
+                <a:solidFill>
+                  <a:schemeClr val="bg1"/>
+                </a:solidFill>
+                <a:latin typeface="Tw Cen MT" panose="020B0602020104020603" pitchFamily="34" charset="77"/>
+              </a:rPr>
+              <a:t>THANK YOU</a:t>
+            </a:r>
+            <a:endParaRPr lang="en-US" dirty="0"/>
+          </a:p>
+        </p:txBody>
+      </p:sp>
+    </p:spTree>
+    <p:extLst>
+      <p:ext uri="{BB962C8B-B14F-4D97-AF65-F5344CB8AC3E}">
+        <p14:creationId xmlns:p14="http://schemas.microsoft.com/office/powerpoint/2010/main" val="1877701230"/>
+      </p:ext>
+    </p:extLst>
+  </p:cSld>
+  <p:clrMapOvr>
+    <a:masterClrMapping/>
+  </p:clrMapOvr>
+</p:sld>
+</file>
+
 <file path=ppt/slides/slide4.xml><?xml version="1.0" encoding="utf-8"?>
 <p:sld xmlns:a="http://schemas.openxmlformats.org/drawingml/2006/main" xmlns:r="http://schemas.openxmlformats.org/officeDocument/2006/relationships" xmlns:p="http://schemas.openxmlformats.org/presentationml/2006/main">
   <p:cSld>
@@ -18644,7 +20122,7 @@
               <a:buChar char="•"/>
             </a:pPr>
             <a:r>
-              <a:rPr lang="en-US" dirty="0"/>
+              <a:rPr lang="en-US" sz="2400" dirty="0"/>
               <a:t>The purpose of this project was to locate a dataset with reasonably clean data which could be queried to establish a predictive outcome based on an event. </a:t>
             </a:r>
           </a:p>
@@ -18654,7 +20132,7 @@
               <a:buChar char="•"/>
             </a:pPr>
             <a:r>
-              <a:rPr lang="en-US" dirty="0"/>
+              <a:rPr lang="en-US" sz="2400" dirty="0"/>
               <a:t>Sports Statistics was determined to have ample data and the basic research approach could be applied to multiple sports.</a:t>
             </a:r>
           </a:p>
@@ -18664,7 +20142,7 @@
               <a:buChar char="•"/>
             </a:pPr>
             <a:r>
-              <a:rPr lang="en-US" dirty="0"/>
+              <a:rPr lang="en-US" sz="2400" dirty="0"/>
               <a:t>Data would range from 1920 – 2023</a:t>
             </a:r>
           </a:p>
@@ -18674,7 +20152,7 @@
               <a:buChar char="•"/>
             </a:pPr>
             <a:r>
-              <a:rPr lang="en-US" dirty="0"/>
+              <a:rPr lang="en-US" sz="2400" dirty="0"/>
               <a:t>Variables and influencing factors were not consistent across then entire timeframe but consistent in linear blocks of time.  Some variables were not recorded until 1950 – 2023.</a:t>
             </a:r>
           </a:p>
@@ -18684,7 +20162,7 @@
               <a:buChar char="•"/>
             </a:pPr>
             <a:r>
-              <a:rPr lang="en-US" dirty="0"/>
+              <a:rPr lang="en-US" sz="2400" dirty="0"/>
               <a:t>Examined Variables:</a:t>
             </a:r>
           </a:p>
@@ -18694,7 +20172,7 @@
               <a:buChar char="•"/>
             </a:pPr>
             <a:r>
-              <a:rPr lang="en-US" dirty="0"/>
+              <a:rPr lang="en-US" sz="2400" dirty="0"/>
               <a:t>Team ELO ratings</a:t>
             </a:r>
           </a:p>
@@ -18704,7 +20182,7 @@
               <a:buChar char="•"/>
             </a:pPr>
             <a:r>
-              <a:rPr lang="en-US" dirty="0"/>
+              <a:rPr lang="en-US" sz="2400" dirty="0"/>
               <a:t>Quarterback ELO ratings (Brief Exp. of how its achieved)</a:t>
             </a:r>
           </a:p>
@@ -18714,7 +20192,7 @@
               <a:buChar char="•"/>
             </a:pPr>
             <a:r>
-              <a:rPr lang="en-US" dirty="0"/>
+              <a:rPr lang="en-US" sz="2400" dirty="0"/>
               <a:t>Game Location</a:t>
             </a:r>
           </a:p>
@@ -18724,7 +20202,7 @@
               <a:buChar char="•"/>
             </a:pPr>
             <a:r>
-              <a:rPr lang="en-US" dirty="0"/>
+              <a:rPr lang="en-US" sz="2400" dirty="0"/>
               <a:t>Referee Favorability</a:t>
             </a:r>
           </a:p>
@@ -18832,9 +20310,6 @@
             </a:pPr>
             <a:r>
               <a:rPr lang="en-US" sz="2800" b="0" dirty="0">
-                <a:solidFill>
-                  <a:srgbClr val="CCCCCC"/>
-                </a:solidFill>
                 <a:effectLst/>
               </a:rPr>
               <a:t>Artificial Intelligence (ChatGPT) was utilized to take project criteria and develop suggested areas for further research.  </a:t>
@@ -18847,12 +20322,9 @@
             </a:pPr>
             <a:r>
               <a:rPr lang="en-US" sz="2800" b="0" dirty="0">
-                <a:solidFill>
-                  <a:srgbClr val="CCCCCC"/>
-                </a:solidFill>
                 <a:effectLst/>
               </a:rPr>
-              <a:t>The group struggled at first to obtain a dataset that related to a specific query or problem statement.  After much research a topic was determined, and the group obtained a clean dataset.  </a:t>
+              <a:t>The group struggled at first to obtain a dataset that related to a specific query or problem statement.  After much research, a topic was determined, and the group obtained a clean dataset.  </a:t>
             </a:r>
           </a:p>
           <a:p>
@@ -18861,28 +20333,15 @@
               <a:buChar char="•"/>
             </a:pPr>
             <a:r>
-              <a:rPr lang="en-US" sz="2800" dirty="0">
-                <a:solidFill>
-                  <a:srgbClr val="CCCCCC"/>
-                </a:solidFill>
-              </a:rPr>
+              <a:rPr lang="en-US" sz="2800" dirty="0"/>
               <a:t>Dataset location - </a:t>
             </a:r>
             <a:r>
               <a:rPr lang="en-US" sz="2800" b="0" dirty="0">
-                <a:solidFill>
-                  <a:srgbClr val="CE9178"/>
-                </a:solidFill>
                 <a:effectLst/>
               </a:rPr>
               <a:t>https://projects.fivethirtyeight.com/nfl-api/nfl_elo.csv</a:t>
             </a:r>
-            <a:endParaRPr lang="en-US" sz="2800" b="0" dirty="0">
-              <a:solidFill>
-                <a:srgbClr val="CCCCCC"/>
-              </a:solidFill>
-              <a:effectLst/>
-            </a:endParaRPr>
           </a:p>
           <a:p>
             <a:pPr marL="457200" indent="-457200" algn="l">
@@ -18891,12 +20350,9 @@
             </a:pPr>
             <a:r>
               <a:rPr lang="en-US" sz="2800" b="0" dirty="0">
-                <a:solidFill>
-                  <a:srgbClr val="CCCCCC"/>
-                </a:solidFill>
                 <a:effectLst/>
               </a:rPr>
-              <a:t>Referee dataset location  -   </a:t>
+              <a:t>Referee dataset location  -  Joe?</a:t>
             </a:r>
           </a:p>
           <a:p>
@@ -18905,11 +20361,7 @@
               <a:buChar char="•"/>
             </a:pPr>
             <a:r>
-              <a:rPr lang="en-US" sz="2800" dirty="0">
-                <a:solidFill>
-                  <a:srgbClr val="CCCCCC"/>
-                </a:solidFill>
-              </a:rPr>
+              <a:rPr lang="en-US" sz="2800" dirty="0"/>
               <a:t>Data format – CSV file format </a:t>
             </a:r>
           </a:p>
@@ -18920,27 +20372,18 @@
             </a:pPr>
             <a:r>
               <a:rPr lang="en-US" sz="2800" b="0" dirty="0">
-                <a:solidFill>
-                  <a:srgbClr val="CCCCCC"/>
-                </a:solidFill>
                 <a:effectLst/>
               </a:rPr>
               <a:t>The data was trained – multiple logistic regression, decision tree, </a:t>
             </a:r>
             <a:r>
               <a:rPr lang="en-US" sz="2800" b="0" dirty="0" err="1">
-                <a:solidFill>
-                  <a:srgbClr val="CCCCCC"/>
-                </a:solidFill>
                 <a:effectLst/>
               </a:rPr>
               <a:t>sk</a:t>
             </a:r>
             <a:r>
               <a:rPr lang="en-US" sz="2800" b="0" dirty="0">
-                <a:solidFill>
-                  <a:srgbClr val="CCCCCC"/>
-                </a:solidFill>
                 <a:effectLst/>
               </a:rPr>
               <a:t>-learn, et.al</a:t>
@@ -19725,7 +21168,7 @@
             </a:pPr>
             <a:r>
               <a:rPr lang="en-US" sz="2400" dirty="0"/>
-              <a:t>Game location was – Was an influential factor.  Team 1 won slightly more often than the away team.</a:t>
+              <a:t>Game location – Was an influential factor.  Team 1 won slightly more often than the away team.</a:t>
             </a:r>
           </a:p>
           <a:p>
@@ -19737,7 +21180,7 @@
               <a:rPr lang="en-US" sz="2400" b="0" dirty="0">
                 <a:effectLst/>
               </a:rPr>
-              <a:t>Referee involvement revealed – </a:t>
+              <a:t>Referee involvement revealed – Joe?</a:t>
             </a:r>
           </a:p>
           <a:p>
@@ -20280,6 +21723,15 @@
 </file>
 
 <file path=customXml/item1.xml><?xml version="1.0" encoding="utf-8"?>
+<?mso-contentType ?>
+<FormTemplates xmlns="http://schemas.microsoft.com/sharepoint/v3/contenttype/forms">
+  <Display>DocumentLibraryForm</Display>
+  <Edit>DocumentLibraryForm</Edit>
+  <New>DocumentLibraryForm</New>
+</FormTemplates>
+</file>
+
+<file path=customXml/item2.xml><?xml version="1.0" encoding="utf-8"?>
 <ct:contentTypeSchema xmlns:ct="http://schemas.microsoft.com/office/2006/metadata/contentType" xmlns:ma="http://schemas.microsoft.com/office/2006/metadata/properties/metaAttributes" ct:_="" ma:_="" ma:contentTypeName="Document" ma:contentTypeID="0x01010079F111ED35F8CC479449609E8A0923A6" ma:contentTypeVersion="25" ma:contentTypeDescription="Create a new document." ma:contentTypeScope="" ma:versionID="e02306daf00165b375dc6a58966960be">
   <xsd:schema xmlns:xsd="http://www.w3.org/2001/XMLSchema" xmlns:xs="http://www.w3.org/2001/XMLSchema" xmlns:p="http://schemas.microsoft.com/office/2006/metadata/properties" xmlns:ns1="http://schemas.microsoft.com/sharepoint/v3" xmlns:ns2="71af3243-3dd4-4a8d-8c0d-dd76da1f02a5" xmlns:ns3="16c05727-aa75-4e4a-9b5f-8a80a1165891" xmlns:ns4="230e9df3-be65-4c73-a93b-d1236ebd677e" targetNamespace="http://schemas.microsoft.com/office/2006/metadata/properties" ma:root="true" ma:fieldsID="df88fb76bf5f555224557953949c1ec9" ns1:_="" ns2:_="" ns3:_="" ns4:_="">
     <xsd:import namespace="http://schemas.microsoft.com/sharepoint/v3"/>
@@ -20573,15 +22025,6 @@
 </ct:contentTypeSchema>
 </file>
 
-<file path=customXml/item2.xml><?xml version="1.0" encoding="utf-8"?>
-<?mso-contentType ?>
-<FormTemplates xmlns="http://schemas.microsoft.com/sharepoint/v3/contenttype/forms">
-  <Display>DocumentLibraryForm</Display>
-  <Edit>DocumentLibraryForm</Edit>
-  <New>DocumentLibraryForm</New>
-</FormTemplates>
-</file>
-
 <file path=customXml/item3.xml><?xml version="1.0" encoding="utf-8"?>
 <p:properties xmlns:p="http://schemas.microsoft.com/office/2006/metadata/properties" xmlns:xsi="http://www.w3.org/2001/XMLSchema-instance" xmlns:pc="http://schemas.microsoft.com/office/infopath/2007/PartnerControls">
   <documentManagement>
@@ -20603,6 +22046,14 @@
 </file>
 
 <file path=customXml/itemProps1.xml><?xml version="1.0" encoding="utf-8"?>
+<ds:datastoreItem xmlns:ds="http://schemas.openxmlformats.org/officeDocument/2006/customXml" ds:itemID="{4F1F1912-3146-44AF-A389-9E8B77BB3688}">
+  <ds:schemaRefs>
+    <ds:schemaRef ds:uri="http://schemas.microsoft.com/sharepoint/v3/contenttype/forms"/>
+  </ds:schemaRefs>
+</ds:datastoreItem>
+</file>
+
+<file path=customXml/itemProps2.xml><?xml version="1.0" encoding="utf-8"?>
 <ds:datastoreItem xmlns:ds="http://schemas.openxmlformats.org/officeDocument/2006/customXml" ds:itemID="{176493A3-2B83-4E58-86AD-56A2F2A20F12}">
   <ds:schemaRefs>
     <ds:schemaRef ds:uri="http://schemas.microsoft.com/office/2006/metadata/contentType"/>
@@ -20623,14 +22074,6 @@
 </ds:datastoreItem>
 </file>
 
-<file path=customXml/itemProps2.xml><?xml version="1.0" encoding="utf-8"?>
-<ds:datastoreItem xmlns:ds="http://schemas.openxmlformats.org/officeDocument/2006/customXml" ds:itemID="{4F1F1912-3146-44AF-A389-9E8B77BB3688}">
-  <ds:schemaRefs>
-    <ds:schemaRef ds:uri="http://schemas.microsoft.com/sharepoint/v3/contenttype/forms"/>
-  </ds:schemaRefs>
-</ds:datastoreItem>
-</file>
-
 <file path=customXml/itemProps3.xml><?xml version="1.0" encoding="utf-8"?>
 <ds:datastoreItem xmlns:ds="http://schemas.openxmlformats.org/officeDocument/2006/customXml" ds:itemID="{F8B8ECF1-2A9D-464C-AFE8-2B3295D0BF97}">
   <ds:schemaRefs>

</xml_diff>